<commit_message>
Update lab a bit
</commit_message>
<xml_diff>
--- a/day1/lab1_bevholt.pptx
+++ b/day1/lab1_bevholt.pptx
@@ -9,9 +9,10 @@
     <p:sldId id="256" r:id="rId3"/>
     <p:sldId id="258" r:id="rId4"/>
     <p:sldId id="260" r:id="rId5"/>
-    <p:sldId id="259" r:id="rId6"/>
-    <p:sldId id="261" r:id="rId7"/>
-    <p:sldId id="262" r:id="rId8"/>
+    <p:sldId id="263" r:id="rId6"/>
+    <p:sldId id="259" r:id="rId7"/>
+    <p:sldId id="261" r:id="rId8"/>
+    <p:sldId id="262" r:id="rId9"/>
   </p:sldIdLst>
   <p:sldSz cx="9144000" cy="6858000" type="screen4x3"/>
   <p:notesSz cx="6858000" cy="9144000"/>
@@ -204,7 +205,7 @@
           </a:ln>
           <a:extLst>
             <a:ext uri="{909E8E84-426E-40dd-AFC4-6F175D3DCCD1}">
-              <a14:hiddenFill xmlns:a14="http://schemas.microsoft.com/office/drawing/2010/main" xmlns="">
+              <a14:hiddenFill xmlns="" xmlns:a14="http://schemas.microsoft.com/office/drawing/2010/main">
                 <a:solidFill>
                   <a:srgbClr val="FFFFFF"/>
                 </a:solidFill>
@@ -247,7 +248,7 @@
           </a:ln>
           <a:extLst>
             <a:ext uri="{909E8E84-426E-40dd-AFC4-6F175D3DCCD1}">
-              <a14:hiddenFill xmlns:a14="http://schemas.microsoft.com/office/drawing/2010/main" xmlns="">
+              <a14:hiddenFill xmlns="" xmlns:a14="http://schemas.microsoft.com/office/drawing/2010/main">
                 <a:noFill/>
               </a14:hiddenFill>
             </a:ext>
@@ -346,7 +347,7 @@
           <a:p>
             <a:fld id="{7A8D528A-DECC-49A5-98E7-F9D465B88842}" type="datetimeFigureOut">
               <a:rPr lang="en-US" smtClean="0"/>
-              <a:t>1/13/2018</a:t>
+              <a:t>1/14/2018</a:t>
             </a:fld>
             <a:endParaRPr lang="en-US"/>
           </a:p>
@@ -533,7 +534,7 @@
           <a:p>
             <a:fld id="{7A8D528A-DECC-49A5-98E7-F9D465B88842}" type="datetimeFigureOut">
               <a:rPr lang="en-US" smtClean="0"/>
-              <a:t>1/13/2018</a:t>
+              <a:t>1/14/2018</a:t>
             </a:fld>
             <a:endParaRPr lang="en-US"/>
           </a:p>
@@ -729,7 +730,7 @@
           <a:p>
             <a:fld id="{7A8D528A-DECC-49A5-98E7-F9D465B88842}" type="datetimeFigureOut">
               <a:rPr lang="en-US" smtClean="0"/>
-              <a:t>1/13/2018</a:t>
+              <a:t>1/14/2018</a:t>
             </a:fld>
             <a:endParaRPr lang="en-US"/>
           </a:p>
@@ -981,7 +982,7 @@
           <a:p>
             <a:fld id="{7A8D528A-DECC-49A5-98E7-F9D465B88842}" type="datetimeFigureOut">
               <a:rPr lang="en-US" smtClean="0"/>
-              <a:t>1/13/2018</a:t>
+              <a:t>1/14/2018</a:t>
             </a:fld>
             <a:endParaRPr lang="en-US"/>
           </a:p>
@@ -1205,7 +1206,7 @@
           <a:p>
             <a:fld id="{7A8D528A-DECC-49A5-98E7-F9D465B88842}" type="datetimeFigureOut">
               <a:rPr lang="en-US" smtClean="0"/>
-              <a:t>1/13/2018</a:t>
+              <a:t>1/14/2018</a:t>
             </a:fld>
             <a:endParaRPr lang="en-US"/>
           </a:p>
@@ -1513,7 +1514,7 @@
           <a:p>
             <a:fld id="{7A8D528A-DECC-49A5-98E7-F9D465B88842}" type="datetimeFigureOut">
               <a:rPr lang="en-US" smtClean="0"/>
-              <a:t>1/13/2018</a:t>
+              <a:t>1/14/2018</a:t>
             </a:fld>
             <a:endParaRPr lang="en-US"/>
           </a:p>
@@ -1681,7 +1682,7 @@
           <a:p>
             <a:fld id="{7A8D528A-DECC-49A5-98E7-F9D465B88842}" type="datetimeFigureOut">
               <a:rPr lang="en-US" smtClean="0"/>
-              <a:t>1/13/2018</a:t>
+              <a:t>1/14/2018</a:t>
             </a:fld>
             <a:endParaRPr lang="en-US"/>
           </a:p>
@@ -1993,7 +1994,7 @@
           <a:p>
             <a:fld id="{7A8D528A-DECC-49A5-98E7-F9D465B88842}" type="datetimeFigureOut">
               <a:rPr lang="en-US" smtClean="0"/>
-              <a:t>1/13/2018</a:t>
+              <a:t>1/14/2018</a:t>
             </a:fld>
             <a:endParaRPr lang="en-US"/>
           </a:p>
@@ -2305,7 +2306,7 @@
           <a:p>
             <a:fld id="{7A8D528A-DECC-49A5-98E7-F9D465B88842}" type="datetimeFigureOut">
               <a:rPr lang="en-US" smtClean="0"/>
-              <a:t>1/13/2018</a:t>
+              <a:t>1/14/2018</a:t>
             </a:fld>
             <a:endParaRPr lang="en-US"/>
           </a:p>
@@ -2525,7 +2526,7 @@
           <a:p>
             <a:fld id="{BA23EE8D-9CE0-4F42-A40F-E28604EA7175}" type="datetime1">
               <a:rPr lang="en-US" smtClean="0"/>
-              <a:t>1/13/2018</a:t>
+              <a:t>1/14/2018</a:t>
             </a:fld>
             <a:endParaRPr lang="en-US"/>
           </a:p>
@@ -2723,7 +2724,7 @@
           <a:p>
             <a:fld id="{1A4DAFB5-4EEC-49BD-AB33-559CD6F558E3}" type="datetime1">
               <a:rPr lang="en-US" smtClean="0"/>
-              <a:t>1/13/2018</a:t>
+              <a:t>1/14/2018</a:t>
             </a:fld>
             <a:endParaRPr lang="en-US"/>
           </a:p>
@@ -2909,7 +2910,7 @@
           <a:p>
             <a:fld id="{7A8D528A-DECC-49A5-98E7-F9D465B88842}" type="datetimeFigureOut">
               <a:rPr lang="en-US" smtClean="0"/>
-              <a:t>1/13/2018</a:t>
+              <a:t>1/14/2018</a:t>
             </a:fld>
             <a:endParaRPr lang="en-US"/>
           </a:p>
@@ -3184,7 +3185,7 @@
           <a:p>
             <a:fld id="{1EE2056D-DC17-4607-87F9-EA4937BD48E2}" type="datetime1">
               <a:rPr lang="en-US" smtClean="0"/>
-              <a:t>1/13/2018</a:t>
+              <a:t>1/14/2018</a:t>
             </a:fld>
             <a:endParaRPr lang="en-US"/>
           </a:p>
@@ -3449,7 +3450,7 @@
           <a:p>
             <a:fld id="{866E3DAD-9254-43DE-A1F3-F1D56B1E5B5F}" type="datetime1">
               <a:rPr lang="en-US" smtClean="0"/>
-              <a:t>1/13/2018</a:t>
+              <a:t>1/14/2018</a:t>
             </a:fld>
             <a:endParaRPr lang="en-US"/>
           </a:p>
@@ -3861,7 +3862,7 @@
           <a:p>
             <a:fld id="{12F88D45-78A7-46A0-99B7-2046E351D366}" type="datetime1">
               <a:rPr lang="en-US" smtClean="0"/>
-              <a:t>1/13/2018</a:t>
+              <a:t>1/14/2018</a:t>
             </a:fld>
             <a:endParaRPr lang="en-US"/>
           </a:p>
@@ -4002,7 +4003,7 @@
           <a:p>
             <a:fld id="{7716AC84-6778-466F-95F9-3EEE8E306ABF}" type="datetime1">
               <a:rPr lang="en-US" smtClean="0"/>
-              <a:t>1/13/2018</a:t>
+              <a:t>1/14/2018</a:t>
             </a:fld>
             <a:endParaRPr lang="en-US"/>
           </a:p>
@@ -4115,7 +4116,7 @@
           <a:p>
             <a:fld id="{02DEDAFE-CBEF-41E8-868F-E40C867A5636}" type="datetime1">
               <a:rPr lang="en-US" smtClean="0"/>
-              <a:t>1/13/2018</a:t>
+              <a:t>1/14/2018</a:t>
             </a:fld>
             <a:endParaRPr lang="en-US"/>
           </a:p>
@@ -4426,7 +4427,7 @@
           <a:p>
             <a:fld id="{20C87E4D-F358-4436-A283-114607D95274}" type="datetime1">
               <a:rPr lang="en-US" smtClean="0"/>
-              <a:t>1/13/2018</a:t>
+              <a:t>1/14/2018</a:t>
             </a:fld>
             <a:endParaRPr lang="en-US"/>
           </a:p>
@@ -4717,7 +4718,7 @@
           <a:p>
             <a:fld id="{6CCABA82-8A7B-4924-987B-0B7221667B17}" type="datetime1">
               <a:rPr lang="en-US" smtClean="0"/>
-              <a:t>1/13/2018</a:t>
+              <a:t>1/14/2018</a:t>
             </a:fld>
             <a:endParaRPr lang="en-US"/>
           </a:p>
@@ -4915,7 +4916,7 @@
           <a:p>
             <a:fld id="{C602C5EE-1F52-440A-B21D-CF34717184B1}" type="datetime1">
               <a:rPr lang="en-US" smtClean="0"/>
-              <a:t>1/13/2018</a:t>
+              <a:t>1/14/2018</a:t>
             </a:fld>
             <a:endParaRPr lang="en-US"/>
           </a:p>
@@ -5123,7 +5124,7 @@
           <a:p>
             <a:fld id="{88EA7AC3-3927-460F-BC0A-B8263F635273}" type="datetime1">
               <a:rPr lang="en-US" smtClean="0"/>
-              <a:t>1/13/2018</a:t>
+              <a:t>1/14/2018</a:t>
             </a:fld>
             <a:endParaRPr lang="en-US"/>
           </a:p>
@@ -5332,7 +5333,7 @@
           <a:p>
             <a:fld id="{7A8D528A-DECC-49A5-98E7-F9D465B88842}" type="datetimeFigureOut">
               <a:rPr lang="en-US" smtClean="0"/>
-              <a:t>1/13/2018</a:t>
+              <a:t>1/14/2018</a:t>
             </a:fld>
             <a:endParaRPr lang="en-US"/>
           </a:p>
@@ -5635,7 +5636,7 @@
           <a:p>
             <a:fld id="{7A8D528A-DECC-49A5-98E7-F9D465B88842}" type="datetimeFigureOut">
               <a:rPr lang="en-US" smtClean="0"/>
-              <a:t>1/13/2018</a:t>
+              <a:t>1/14/2018</a:t>
             </a:fld>
             <a:endParaRPr lang="en-US"/>
           </a:p>
@@ -6077,7 +6078,7 @@
           <a:p>
             <a:fld id="{7A8D528A-DECC-49A5-98E7-F9D465B88842}" type="datetimeFigureOut">
               <a:rPr lang="en-US" smtClean="0"/>
-              <a:t>1/13/2018</a:t>
+              <a:t>1/14/2018</a:t>
             </a:fld>
             <a:endParaRPr lang="en-US"/>
           </a:p>
@@ -6212,7 +6213,7 @@
           <a:p>
             <a:fld id="{7A8D528A-DECC-49A5-98E7-F9D465B88842}" type="datetimeFigureOut">
               <a:rPr lang="en-US" smtClean="0"/>
-              <a:t>1/13/2018</a:t>
+              <a:t>1/14/2018</a:t>
             </a:fld>
             <a:endParaRPr lang="en-US"/>
           </a:p>
@@ -6325,7 +6326,7 @@
           <a:p>
             <a:fld id="{7A8D528A-DECC-49A5-98E7-F9D465B88842}" type="datetimeFigureOut">
               <a:rPr lang="en-US" smtClean="0"/>
-              <a:t>1/13/2018</a:t>
+              <a:t>1/14/2018</a:t>
             </a:fld>
             <a:endParaRPr lang="en-US"/>
           </a:p>
@@ -6618,7 +6619,7 @@
           <a:p>
             <a:fld id="{7A8D528A-DECC-49A5-98E7-F9D465B88842}" type="datetimeFigureOut">
               <a:rPr lang="en-US" smtClean="0"/>
-              <a:t>1/13/2018</a:t>
+              <a:t>1/14/2018</a:t>
             </a:fld>
             <a:endParaRPr lang="en-US"/>
           </a:p>
@@ -6892,7 +6893,7 @@
           <a:p>
             <a:fld id="{7A8D528A-DECC-49A5-98E7-F9D465B88842}" type="datetimeFigureOut">
               <a:rPr lang="en-US" smtClean="0"/>
-              <a:t>1/13/2018</a:t>
+              <a:t>1/14/2018</a:t>
             </a:fld>
             <a:endParaRPr lang="en-US"/>
           </a:p>
@@ -7014,17 +7015,17 @@
           </a:ln>
           <a:extLst>
             <a:ext uri="{FAA26D3D-D897-4be2-8F04-BA451C77F1D7}">
-              <ma14:placeholderFlag xmlns:ma14="http://schemas.microsoft.com/office/mac/drawingml/2011/main" xmlns="" val="1"/>
+              <ma14:placeholderFlag xmlns="" xmlns:ma14="http://schemas.microsoft.com/office/mac/drawingml/2011/main" val="1"/>
             </a:ext>
             <a:ext uri="{909E8E84-426E-40dd-AFC4-6F175D3DCCD1}">
-              <a14:hiddenFill xmlns:a14="http://schemas.microsoft.com/office/drawing/2010/main" xmlns="">
+              <a14:hiddenFill xmlns="" xmlns:a14="http://schemas.microsoft.com/office/drawing/2010/main">
                 <a:solidFill>
                   <a:srgbClr val="FFFFFF"/>
                 </a:solidFill>
               </a14:hiddenFill>
             </a:ext>
             <a:ext uri="{91240B29-F687-4f45-9708-019B960494DF}">
-              <a14:hiddenLine xmlns:a14="http://schemas.microsoft.com/office/drawing/2010/main" xmlns="" w="9525">
+              <a14:hiddenLine xmlns="" xmlns:a14="http://schemas.microsoft.com/office/drawing/2010/main" w="9525">
                 <a:solidFill>
                   <a:srgbClr val="000000"/>
                 </a:solidFill>
@@ -7076,17 +7077,17 @@
           </a:ln>
           <a:extLst>
             <a:ext uri="{FAA26D3D-D897-4be2-8F04-BA451C77F1D7}">
-              <ma14:placeholderFlag xmlns:ma14="http://schemas.microsoft.com/office/mac/drawingml/2011/main" xmlns="" val="1"/>
+              <ma14:placeholderFlag xmlns="" xmlns:ma14="http://schemas.microsoft.com/office/mac/drawingml/2011/main" val="1"/>
             </a:ext>
             <a:ext uri="{909E8E84-426E-40dd-AFC4-6F175D3DCCD1}">
-              <a14:hiddenFill xmlns:a14="http://schemas.microsoft.com/office/drawing/2010/main" xmlns="">
+              <a14:hiddenFill xmlns="" xmlns:a14="http://schemas.microsoft.com/office/drawing/2010/main">
                 <a:solidFill>
                   <a:srgbClr val="FFFFFF"/>
                 </a:solidFill>
               </a14:hiddenFill>
             </a:ext>
             <a:ext uri="{91240B29-F687-4f45-9708-019B960494DF}">
-              <a14:hiddenLine xmlns:a14="http://schemas.microsoft.com/office/drawing/2010/main" xmlns="" w="9525">
+              <a14:hiddenLine xmlns="" xmlns:a14="http://schemas.microsoft.com/office/drawing/2010/main" w="9525">
                 <a:solidFill>
                   <a:srgbClr val="000000"/>
                 </a:solidFill>
@@ -7186,7 +7187,7 @@
           <a:p>
             <a:fld id="{7A8D528A-DECC-49A5-98E7-F9D465B88842}" type="datetimeFigureOut">
               <a:rPr lang="en-US" smtClean="0"/>
-              <a:t>1/13/2018</a:t>
+              <a:t>1/14/2018</a:t>
             </a:fld>
             <a:endParaRPr lang="en-US"/>
           </a:p>
@@ -7354,7 +7355,7 @@
           </a:ln>
           <a:extLst>
             <a:ext uri="{909E8E84-426E-40dd-AFC4-6F175D3DCCD1}">
-              <a14:hiddenFill xmlns:a14="http://schemas.microsoft.com/office/drawing/2010/main" xmlns="">
+              <a14:hiddenFill xmlns="" xmlns:a14="http://schemas.microsoft.com/office/drawing/2010/main">
                 <a:solidFill>
                   <a:srgbClr val="FFFFFF"/>
                 </a:solidFill>
@@ -7397,7 +7398,7 @@
           </a:ln>
           <a:extLst>
             <a:ext uri="{909E8E84-426E-40dd-AFC4-6F175D3DCCD1}">
-              <a14:hiddenFill xmlns:a14="http://schemas.microsoft.com/office/drawing/2010/main" xmlns="">
+              <a14:hiddenFill xmlns="" xmlns:a14="http://schemas.microsoft.com/office/drawing/2010/main">
                 <a:noFill/>
               </a14:hiddenFill>
             </a:ext>
@@ -8032,7 +8033,7 @@
           <a:p>
             <a:fld id="{A7853F80-D63E-429F-B326-B00475E1D8E8}" type="datetime1">
               <a:rPr lang="en-US" smtClean="0"/>
-              <a:t>1/13/2018</a:t>
+              <a:t>1/14/2018</a:t>
             </a:fld>
             <a:endParaRPr lang="en-US"/>
           </a:p>
@@ -8654,7 +8655,7 @@
           <a:graphicData uri="http://schemas.openxmlformats.org/presentationml/2006/ole">
             <mc:AlternateContent xmlns:mc="http://schemas.openxmlformats.org/markup-compatibility/2006">
               <mc:Choice xmlns:v="urn:schemas-microsoft-com:vml" Requires="v">
-                <p:oleObj spid="_x0000_s1033" name="Equation" r:id="rId3" imgW="2692080" imgH="634680" progId="Equation.DSMT4">
+                <p:oleObj spid="_x0000_s1035" name="Equation" r:id="rId3" imgW="2692080" imgH="634680" progId="Equation.DSMT4">
                   <p:embed/>
                 </p:oleObj>
               </mc:Choice>
@@ -8819,10 +8820,10 @@
       </p:grpSpPr>
       <p:sp>
         <p:nvSpPr>
-          <p:cNvPr id="2" name="Title 1">
+          <p:cNvPr id="3" name="Content Placeholder 2">
             <a:extLst>
               <a:ext uri="{FF2B5EF4-FFF2-40B4-BE49-F238E27FC236}">
-                <a16:creationId xmlns:a16="http://schemas.microsoft.com/office/drawing/2014/main" id="{8E0EE53A-651A-4D14-8ED8-844CD15A79D6}"/>
+                <a16:creationId xmlns:a16="http://schemas.microsoft.com/office/drawing/2014/main" id="{0FE1B281-048D-4876-900A-45C80731634E}"/>
               </a:ext>
             </a:extLst>
           </p:cNvPr>
@@ -8830,153 +8831,387 @@
             <a:spLocks noGrp="1"/>
           </p:cNvSpPr>
           <p:nvPr>
-            <p:ph type="title"/>
-          </p:nvPr>
-        </p:nvSpPr>
-        <p:spPr/>
-        <p:txBody>
-          <a:bodyPr/>
-          <a:lstStyle/>
-          <a:p>
-            <a:r>
-              <a:rPr lang="en-US" dirty="0" err="1"/>
-              <a:t>Beverton</a:t>
-            </a:r>
-            <a:r>
-              <a:rPr lang="en-US" dirty="0"/>
-              <a:t>-Hold Exercises #1 </a:t>
-            </a:r>
-          </a:p>
-        </p:txBody>
-      </p:sp>
-      <p:sp>
-        <p:nvSpPr>
-          <p:cNvPr id="3" name="Content Placeholder 2">
-            <a:extLst>
-              <a:ext uri="{FF2B5EF4-FFF2-40B4-BE49-F238E27FC236}">
-                <a16:creationId xmlns:a16="http://schemas.microsoft.com/office/drawing/2014/main" id="{BDEFFF4C-D827-448B-BDCC-989C6D68C921}"/>
-              </a:ext>
-            </a:extLst>
-          </p:cNvPr>
-          <p:cNvSpPr>
-            <a:spLocks noGrp="1"/>
-          </p:cNvSpPr>
-          <p:nvPr>
             <p:ph idx="1"/>
           </p:nvPr>
         </p:nvSpPr>
         <p:spPr>
           <a:xfrm>
-            <a:off x="628650" y="1371600"/>
-            <a:ext cx="7886700" cy="4805363"/>
+            <a:off x="628650" y="691116"/>
+            <a:ext cx="7886700" cy="5485847"/>
           </a:xfrm>
         </p:spPr>
         <p:txBody>
           <a:bodyPr>
-            <a:normAutofit lnSpcReduction="10000"/>
+            <a:normAutofit/>
           </a:bodyPr>
           <a:lstStyle/>
           <a:p>
-            <a:pPr marL="514350" indent="-514350">
-              <a:buFont typeface="+mj-lt"/>
-              <a:buAutoNum type="arabicPeriod"/>
+            <a:pPr marL="0" indent="0">
+              <a:buNone/>
             </a:pPr>
             <a:r>
-              <a:rPr lang="en-US" dirty="0"/>
-              <a:t>Plot MLE fit to the data</a:t>
-            </a:r>
-          </a:p>
-          <a:p>
-            <a:pPr marL="514350" indent="-514350">
-              <a:buFont typeface="+mj-lt"/>
-              <a:buAutoNum type="arabicPeriod"/>
+              <a:rPr lang="en-US" sz="2000" dirty="0">
+                <a:latin typeface="Courier New" panose="02070309020205020404" pitchFamily="49" charset="0"/>
+                <a:cs typeface="Courier New" panose="02070309020205020404" pitchFamily="49" charset="0"/>
+              </a:rPr>
+              <a:t>library(TMB)</a:t>
+            </a:r>
+          </a:p>
+          <a:p>
+            <a:pPr marL="0" indent="0">
+              <a:buNone/>
             </a:pPr>
             <a:r>
-              <a:rPr lang="en-US" dirty="0"/>
-              <a:t>Re-optimize model from a grid of starting points:</a:t>
-            </a:r>
-          </a:p>
-          <a:p>
-            <a:pPr marL="914400" lvl="1" indent="-457200">
-              <a:buFont typeface="+mj-lt"/>
-              <a:buAutoNum type="arabicPeriod"/>
+              <a:rPr lang="en-US" sz="2000">
+                <a:latin typeface="Courier New" panose="02070309020205020404" pitchFamily="49" charset="0"/>
+                <a:cs typeface="Courier New" panose="02070309020205020404" pitchFamily="49" charset="0"/>
+              </a:rPr>
+              <a:t>compile</a:t>
+            </a:r>
+            <a:r>
+              <a:rPr lang="en-US" sz="2000" dirty="0">
+                <a:latin typeface="Courier New" panose="02070309020205020404" pitchFamily="49" charset="0"/>
+                <a:cs typeface="Courier New" panose="02070309020205020404" pitchFamily="49" charset="0"/>
+              </a:rPr>
+              <a:t>("</a:t>
+            </a:r>
+            <a:r>
+              <a:rPr lang="en-US" sz="2000" dirty="0" err="1">
+                <a:latin typeface="Courier New" panose="02070309020205020404" pitchFamily="49" charset="0"/>
+                <a:cs typeface="Courier New" panose="02070309020205020404" pitchFamily="49" charset="0"/>
+              </a:rPr>
+              <a:t>tmb_models</a:t>
+            </a:r>
+            <a:r>
+              <a:rPr lang="en-US" sz="2000" dirty="0">
+                <a:latin typeface="Courier New" panose="02070309020205020404" pitchFamily="49" charset="0"/>
+                <a:cs typeface="Courier New" panose="02070309020205020404" pitchFamily="49" charset="0"/>
+              </a:rPr>
+              <a:t>/bevholt.cpp")</a:t>
+            </a:r>
+          </a:p>
+          <a:p>
+            <a:pPr marL="0" indent="0">
+              <a:buNone/>
             </a:pPr>
             <a:r>
-              <a:rPr lang="en-US" dirty="0" err="1"/>
+              <a:rPr lang="en-US" sz="2000" dirty="0" err="1">
+                <a:latin typeface="Courier New" panose="02070309020205020404" pitchFamily="49" charset="0"/>
+                <a:cs typeface="Courier New" panose="02070309020205020404" pitchFamily="49" charset="0"/>
+              </a:rPr>
+              <a:t>dyn.load</a:t>
+            </a:r>
+            <a:r>
+              <a:rPr lang="en-US" sz="2000" dirty="0">
+                <a:latin typeface="Courier New" panose="02070309020205020404" pitchFamily="49" charset="0"/>
+                <a:cs typeface="Courier New" panose="02070309020205020404" pitchFamily="49" charset="0"/>
+              </a:rPr>
+              <a:t>(</a:t>
+            </a:r>
+            <a:r>
+              <a:rPr lang="en-US" sz="2000" dirty="0" err="1">
+                <a:latin typeface="Courier New" panose="02070309020205020404" pitchFamily="49" charset="0"/>
+                <a:cs typeface="Courier New" panose="02070309020205020404" pitchFamily="49" charset="0"/>
+              </a:rPr>
+              <a:t>dynlib</a:t>
+            </a:r>
+            <a:r>
+              <a:rPr lang="en-US" sz="2000" dirty="0">
+                <a:latin typeface="Courier New" panose="02070309020205020404" pitchFamily="49" charset="0"/>
+                <a:cs typeface="Courier New" panose="02070309020205020404" pitchFamily="49" charset="0"/>
+              </a:rPr>
+              <a:t>("</a:t>
+            </a:r>
+            <a:r>
+              <a:rPr lang="en-US" sz="2000" dirty="0" err="1">
+                <a:latin typeface="Courier New" panose="02070309020205020404" pitchFamily="49" charset="0"/>
+                <a:cs typeface="Courier New" panose="02070309020205020404" pitchFamily="49" charset="0"/>
+              </a:rPr>
+              <a:t>tmb_models</a:t>
+            </a:r>
+            <a:r>
+              <a:rPr lang="en-US" sz="2000" dirty="0">
+                <a:latin typeface="Courier New" panose="02070309020205020404" pitchFamily="49" charset="0"/>
+                <a:cs typeface="Courier New" panose="02070309020205020404" pitchFamily="49" charset="0"/>
+              </a:rPr>
+              <a:t>/</a:t>
+            </a:r>
+            <a:r>
+              <a:rPr lang="en-US" sz="2000" dirty="0" err="1">
+                <a:latin typeface="Courier New" panose="02070309020205020404" pitchFamily="49" charset="0"/>
+                <a:cs typeface="Courier New" panose="02070309020205020404" pitchFamily="49" charset="0"/>
+              </a:rPr>
+              <a:t>bevholt</a:t>
+            </a:r>
+            <a:r>
+              <a:rPr lang="en-US" sz="2000" dirty="0">
+                <a:latin typeface="Courier New" panose="02070309020205020404" pitchFamily="49" charset="0"/>
+                <a:cs typeface="Courier New" panose="02070309020205020404" pitchFamily="49" charset="0"/>
+              </a:rPr>
+              <a:t>"))</a:t>
+            </a:r>
+          </a:p>
+          <a:p>
+            <a:pPr marL="0" indent="0">
+              <a:buNone/>
+            </a:pPr>
+            <a:endParaRPr lang="en-US" sz="2000" dirty="0">
+              <a:latin typeface="Courier New" panose="02070309020205020404" pitchFamily="49" charset="0"/>
+              <a:cs typeface="Courier New" panose="02070309020205020404" pitchFamily="49" charset="0"/>
+            </a:endParaRPr>
+          </a:p>
+          <a:p>
+            <a:pPr marL="0" indent="0">
+              <a:buNone/>
+            </a:pPr>
+            <a:r>
+              <a:rPr lang="en-US" sz="2000" dirty="0" err="1">
+                <a:latin typeface="Courier New" panose="02070309020205020404" pitchFamily="49" charset="0"/>
+                <a:cs typeface="Courier New" panose="02070309020205020404" pitchFamily="49" charset="0"/>
+              </a:rPr>
+              <a:t>dat</a:t>
+            </a:r>
+            <a:r>
+              <a:rPr lang="en-US" sz="2000" dirty="0">
+                <a:latin typeface="Courier New" panose="02070309020205020404" pitchFamily="49" charset="0"/>
+                <a:cs typeface="Courier New" panose="02070309020205020404" pitchFamily="49" charset="0"/>
+              </a:rPr>
+              <a:t> &lt;- </a:t>
+            </a:r>
+            <a:r>
+              <a:rPr lang="en-US" sz="2000" dirty="0" err="1">
+                <a:latin typeface="Courier New" panose="02070309020205020404" pitchFamily="49" charset="0"/>
+                <a:cs typeface="Courier New" panose="02070309020205020404" pitchFamily="49" charset="0"/>
+              </a:rPr>
+              <a:t>read.table</a:t>
+            </a:r>
+            <a:r>
+              <a:rPr lang="en-US" sz="2000" dirty="0">
+                <a:latin typeface="Courier New" panose="02070309020205020404" pitchFamily="49" charset="0"/>
+                <a:cs typeface="Courier New" panose="02070309020205020404" pitchFamily="49" charset="0"/>
+              </a:rPr>
+              <a:t>("</a:t>
+            </a:r>
+            <a:r>
+              <a:rPr lang="en-US" sz="2000" dirty="0" err="1">
+                <a:latin typeface="Courier New" panose="02070309020205020404" pitchFamily="49" charset="0"/>
+                <a:cs typeface="Courier New" panose="02070309020205020404" pitchFamily="49" charset="0"/>
+              </a:rPr>
+              <a:t>tmb_models</a:t>
+            </a:r>
+            <a:r>
+              <a:rPr lang="en-US" sz="2000" dirty="0">
+                <a:latin typeface="Courier New" panose="02070309020205020404" pitchFamily="49" charset="0"/>
+                <a:cs typeface="Courier New" panose="02070309020205020404" pitchFamily="49" charset="0"/>
+              </a:rPr>
+              <a:t>/bevholt.dat", header=TRUE)</a:t>
+            </a:r>
+          </a:p>
+          <a:p>
+            <a:pPr marL="0" indent="0">
+              <a:buNone/>
+            </a:pPr>
+            <a:r>
+              <a:rPr lang="en-US" sz="2000" dirty="0">
+                <a:latin typeface="Courier New" panose="02070309020205020404" pitchFamily="49" charset="0"/>
+                <a:cs typeface="Courier New" panose="02070309020205020404" pitchFamily="49" charset="0"/>
+              </a:rPr>
+              <a:t>data &lt;- list(SSB=</a:t>
+            </a:r>
+            <a:r>
+              <a:rPr lang="en-US" sz="2000" dirty="0" err="1">
+                <a:latin typeface="Courier New" panose="02070309020205020404" pitchFamily="49" charset="0"/>
+                <a:cs typeface="Courier New" panose="02070309020205020404" pitchFamily="49" charset="0"/>
+              </a:rPr>
+              <a:t>dat$ssb,logR</a:t>
+            </a:r>
+            <a:r>
+              <a:rPr lang="en-US" sz="2000" dirty="0">
+                <a:latin typeface="Courier New" panose="02070309020205020404" pitchFamily="49" charset="0"/>
+                <a:cs typeface="Courier New" panose="02070309020205020404" pitchFamily="49" charset="0"/>
+              </a:rPr>
+              <a:t>=</a:t>
+            </a:r>
+            <a:r>
+              <a:rPr lang="en-US" sz="2000" dirty="0" err="1">
+                <a:latin typeface="Courier New" panose="02070309020205020404" pitchFamily="49" charset="0"/>
+                <a:cs typeface="Courier New" panose="02070309020205020404" pitchFamily="49" charset="0"/>
+              </a:rPr>
+              <a:t>dat$logR</a:t>
+            </a:r>
+            <a:r>
+              <a:rPr lang="en-US" sz="2000" dirty="0">
+                <a:latin typeface="Courier New" panose="02070309020205020404" pitchFamily="49" charset="0"/>
+                <a:cs typeface="Courier New" panose="02070309020205020404" pitchFamily="49" charset="0"/>
+              </a:rPr>
+              <a:t>)</a:t>
+            </a:r>
+          </a:p>
+          <a:p>
+            <a:pPr marL="0" indent="0">
+              <a:buNone/>
+            </a:pPr>
+            <a:r>
+              <a:rPr lang="en-US" sz="2000" dirty="0">
+                <a:latin typeface="Courier New" panose="02070309020205020404" pitchFamily="49" charset="0"/>
+                <a:cs typeface="Courier New" panose="02070309020205020404" pitchFamily="49" charset="0"/>
+              </a:rPr>
+              <a:t>parameters &lt;- list(</a:t>
+            </a:r>
+            <a:r>
+              <a:rPr lang="en-US" sz="2000" dirty="0" err="1">
+                <a:latin typeface="Courier New" panose="02070309020205020404" pitchFamily="49" charset="0"/>
+                <a:cs typeface="Courier New" panose="02070309020205020404" pitchFamily="49" charset="0"/>
+              </a:rPr>
               <a:t>logA</a:t>
             </a:r>
             <a:r>
-              <a:rPr lang="en-US" dirty="0"/>
-              <a:t> between c(-5,10) and </a:t>
-            </a:r>
-            <a:r>
-              <a:rPr lang="en-US" dirty="0" err="1"/>
+              <a:rPr lang="en-US" sz="2000" dirty="0">
+                <a:latin typeface="Courier New" panose="02070309020205020404" pitchFamily="49" charset="0"/>
+                <a:cs typeface="Courier New" panose="02070309020205020404" pitchFamily="49" charset="0"/>
+              </a:rPr>
+              <a:t>=0, </a:t>
+            </a:r>
+            <a:r>
+              <a:rPr lang="en-US" sz="2000" dirty="0" err="1">
+                <a:latin typeface="Courier New" panose="02070309020205020404" pitchFamily="49" charset="0"/>
+                <a:cs typeface="Courier New" panose="02070309020205020404" pitchFamily="49" charset="0"/>
+              </a:rPr>
               <a:t>logB</a:t>
             </a:r>
             <a:r>
-              <a:rPr lang="en-US" dirty="0"/>
-              <a:t> between c(-15,0)</a:t>
-            </a:r>
-          </a:p>
-          <a:p>
-            <a:pPr marL="914400" lvl="1" indent="-457200">
-              <a:buFont typeface="+mj-lt"/>
-              <a:buAutoNum type="arabicPeriod"/>
+              <a:rPr lang="en-US" sz="2000" dirty="0">
+                <a:latin typeface="Courier New" panose="02070309020205020404" pitchFamily="49" charset="0"/>
+                <a:cs typeface="Courier New" panose="02070309020205020404" pitchFamily="49" charset="0"/>
+              </a:rPr>
+              <a:t>=0)</a:t>
+            </a:r>
+          </a:p>
+          <a:p>
+            <a:pPr marL="0" indent="0">
+              <a:buNone/>
             </a:pPr>
-            <a:r>
-              <a:rPr lang="en-US" dirty="0"/>
-              <a:t>Use 100 steps for each (100.000 total </a:t>
-            </a:r>
-            <a:r>
-              <a:rPr lang="en-US" dirty="0" err="1"/>
-              <a:t>inits</a:t>
-            </a:r>
-            <a:r>
-              <a:rPr lang="en-US" dirty="0"/>
-              <a:t>)</a:t>
-            </a:r>
-          </a:p>
-          <a:p>
-            <a:pPr marL="914400" lvl="1" indent="-457200">
-              <a:buFont typeface="+mj-lt"/>
-              <a:buAutoNum type="arabicPeriod"/>
+            <a:endParaRPr lang="en-US" sz="2000" dirty="0">
+              <a:latin typeface="Courier New" panose="02070309020205020404" pitchFamily="49" charset="0"/>
+              <a:cs typeface="Courier New" panose="02070309020205020404" pitchFamily="49" charset="0"/>
+            </a:endParaRPr>
+          </a:p>
+          <a:p>
+            <a:pPr marL="0" indent="0">
+              <a:buNone/>
             </a:pPr>
             <a:r>
-              <a:rPr lang="en-US" dirty="0"/>
-              <a:t>Check they all find the same minimum</a:t>
-            </a:r>
-          </a:p>
-          <a:p>
-            <a:pPr marL="914400" lvl="1" indent="-457200">
-              <a:buFont typeface="+mj-lt"/>
-              <a:buAutoNum type="arabicPeriod"/>
+              <a:rPr lang="en-US" sz="2000" dirty="0" err="1">
+                <a:latin typeface="Courier New" panose="02070309020205020404" pitchFamily="49" charset="0"/>
+                <a:cs typeface="Courier New" panose="02070309020205020404" pitchFamily="49" charset="0"/>
+              </a:rPr>
+              <a:t>obj</a:t>
+            </a:r>
+            <a:r>
+              <a:rPr lang="en-US" sz="2000" dirty="0">
+                <a:latin typeface="Courier New" panose="02070309020205020404" pitchFamily="49" charset="0"/>
+                <a:cs typeface="Courier New" panose="02070309020205020404" pitchFamily="49" charset="0"/>
+              </a:rPr>
+              <a:t> &lt;- </a:t>
+            </a:r>
+            <a:r>
+              <a:rPr lang="en-US" sz="2000" dirty="0" err="1">
+                <a:latin typeface="Courier New" panose="02070309020205020404" pitchFamily="49" charset="0"/>
+                <a:cs typeface="Courier New" panose="02070309020205020404" pitchFamily="49" charset="0"/>
+              </a:rPr>
+              <a:t>MakeADFun</a:t>
+            </a:r>
+            <a:r>
+              <a:rPr lang="en-US" sz="2000" dirty="0">
+                <a:latin typeface="Courier New" panose="02070309020205020404" pitchFamily="49" charset="0"/>
+                <a:cs typeface="Courier New" panose="02070309020205020404" pitchFamily="49" charset="0"/>
+              </a:rPr>
+              <a:t>(</a:t>
+            </a:r>
+            <a:r>
+              <a:rPr lang="en-US" sz="2000" dirty="0" err="1">
+                <a:latin typeface="Courier New" panose="02070309020205020404" pitchFamily="49" charset="0"/>
+                <a:cs typeface="Courier New" panose="02070309020205020404" pitchFamily="49" charset="0"/>
+              </a:rPr>
+              <a:t>data,parameters,DLL</a:t>
+            </a:r>
+            <a:r>
+              <a:rPr lang="en-US" sz="2000" dirty="0">
+                <a:latin typeface="Courier New" panose="02070309020205020404" pitchFamily="49" charset="0"/>
+                <a:cs typeface="Courier New" panose="02070309020205020404" pitchFamily="49" charset="0"/>
+              </a:rPr>
+              <a:t>="</a:t>
+            </a:r>
+            <a:r>
+              <a:rPr lang="en-US" sz="2000" dirty="0" err="1">
+                <a:latin typeface="Courier New" panose="02070309020205020404" pitchFamily="49" charset="0"/>
+                <a:cs typeface="Courier New" panose="02070309020205020404" pitchFamily="49" charset="0"/>
+              </a:rPr>
+              <a:t>bevholt</a:t>
+            </a:r>
+            <a:r>
+              <a:rPr lang="en-US" sz="2000" dirty="0">
+                <a:latin typeface="Courier New" panose="02070309020205020404" pitchFamily="49" charset="0"/>
+                <a:cs typeface="Courier New" panose="02070309020205020404" pitchFamily="49" charset="0"/>
+              </a:rPr>
+              <a:t>")</a:t>
+            </a:r>
+          </a:p>
+          <a:p>
+            <a:pPr marL="0" indent="0">
+              <a:buNone/>
             </a:pPr>
             <a:r>
-              <a:rPr lang="en-US" dirty="0"/>
-              <a:t>How much variation in # of </a:t>
-            </a:r>
-            <a:r>
-              <a:rPr lang="en-US" dirty="0" err="1"/>
-              <a:t>evals</a:t>
-            </a:r>
-            <a:r>
-              <a:rPr lang="en-US" dirty="0"/>
-              <a:t>?</a:t>
+              <a:rPr lang="en-US" sz="2000" dirty="0" err="1">
+                <a:latin typeface="Courier New" panose="02070309020205020404" pitchFamily="49" charset="0"/>
+                <a:cs typeface="Courier New" panose="02070309020205020404" pitchFamily="49" charset="0"/>
+              </a:rPr>
+              <a:t>obj$env$beSilent</a:t>
+            </a:r>
+            <a:r>
+              <a:rPr lang="en-US" sz="2000" dirty="0">
+                <a:latin typeface="Courier New" panose="02070309020205020404" pitchFamily="49" charset="0"/>
+                <a:cs typeface="Courier New" panose="02070309020205020404" pitchFamily="49" charset="0"/>
+              </a:rPr>
+              <a:t>() # silences console output</a:t>
             </a:r>
           </a:p>
           <a:p>
             <a:pPr marL="0" indent="0">
               <a:buNone/>
             </a:pPr>
-            <a:endParaRPr lang="en-US" dirty="0"/>
+            <a:r>
+              <a:rPr lang="en-US" sz="2000" dirty="0" err="1">
+                <a:latin typeface="Courier New" panose="02070309020205020404" pitchFamily="49" charset="0"/>
+                <a:cs typeface="Courier New" panose="02070309020205020404" pitchFamily="49" charset="0"/>
+              </a:rPr>
+              <a:t>obj$fn</a:t>
+            </a:r>
+            <a:r>
+              <a:rPr lang="en-US" sz="2000" dirty="0">
+                <a:latin typeface="Courier New" panose="02070309020205020404" pitchFamily="49" charset="0"/>
+                <a:cs typeface="Courier New" panose="02070309020205020404" pitchFamily="49" charset="0"/>
+              </a:rPr>
+              <a:t>()</a:t>
+            </a:r>
           </a:p>
           <a:p>
             <a:pPr marL="0" indent="0">
               <a:buNone/>
             </a:pPr>
             <a:r>
-              <a:rPr lang="en-US" dirty="0"/>
-              <a:t>…. Review answers		</a:t>
+              <a:rPr lang="en-US" sz="2000" dirty="0" err="1">
+                <a:latin typeface="Courier New" panose="02070309020205020404" pitchFamily="49" charset="0"/>
+                <a:cs typeface="Courier New" panose="02070309020205020404" pitchFamily="49" charset="0"/>
+              </a:rPr>
+              <a:t>obj$gr</a:t>
+            </a:r>
+            <a:r>
+              <a:rPr lang="en-US" sz="2000" dirty="0">
+                <a:latin typeface="Courier New" panose="02070309020205020404" pitchFamily="49" charset="0"/>
+                <a:cs typeface="Courier New" panose="02070309020205020404" pitchFamily="49" charset="0"/>
+              </a:rPr>
+              <a:t>()</a:t>
             </a:r>
           </a:p>
         </p:txBody>
@@ -8984,7 +9219,7 @@
     </p:spTree>
     <p:extLst>
       <p:ext uri="{BB962C8B-B14F-4D97-AF65-F5344CB8AC3E}">
-        <p14:creationId xmlns:p14="http://schemas.microsoft.com/office/powerpoint/2010/main" val="3198772232"/>
+        <p14:creationId xmlns:p14="http://schemas.microsoft.com/office/powerpoint/2010/main" val="3181880112"/>
       </p:ext>
     </p:extLst>
   </p:cSld>
@@ -9038,6 +9273,200 @@
             </a:r>
             <a:r>
               <a:rPr lang="en-US" dirty="0"/>
+              <a:t>-Hold Exercises #1 </a:t>
+            </a:r>
+          </a:p>
+        </p:txBody>
+      </p:sp>
+      <p:sp>
+        <p:nvSpPr>
+          <p:cNvPr id="3" name="Content Placeholder 2">
+            <a:extLst>
+              <a:ext uri="{FF2B5EF4-FFF2-40B4-BE49-F238E27FC236}">
+                <a16:creationId xmlns:a16="http://schemas.microsoft.com/office/drawing/2014/main" id="{BDEFFF4C-D827-448B-BDCC-989C6D68C921}"/>
+              </a:ext>
+            </a:extLst>
+          </p:cNvPr>
+          <p:cNvSpPr>
+            <a:spLocks noGrp="1"/>
+          </p:cNvSpPr>
+          <p:nvPr>
+            <p:ph idx="1"/>
+          </p:nvPr>
+        </p:nvSpPr>
+        <p:spPr>
+          <a:xfrm>
+            <a:off x="628650" y="1371600"/>
+            <a:ext cx="7886700" cy="4805363"/>
+          </a:xfrm>
+        </p:spPr>
+        <p:txBody>
+          <a:bodyPr>
+            <a:normAutofit lnSpcReduction="10000"/>
+          </a:bodyPr>
+          <a:lstStyle/>
+          <a:p>
+            <a:pPr marL="514350" indent="-514350">
+              <a:buFont typeface="+mj-lt"/>
+              <a:buAutoNum type="arabicPeriod"/>
+            </a:pPr>
+            <a:r>
+              <a:rPr lang="en-US" dirty="0"/>
+              <a:t>Plot MLE fit to the data</a:t>
+            </a:r>
+          </a:p>
+          <a:p>
+            <a:pPr marL="514350" indent="-514350">
+              <a:buFont typeface="+mj-lt"/>
+              <a:buAutoNum type="arabicPeriod"/>
+            </a:pPr>
+            <a:r>
+              <a:rPr lang="en-US" dirty="0"/>
+              <a:t>Re-optimize model from a grid of starting points:</a:t>
+            </a:r>
+          </a:p>
+          <a:p>
+            <a:pPr marL="914400" lvl="1" indent="-457200">
+              <a:buFont typeface="+mj-lt"/>
+              <a:buAutoNum type="arabicPeriod"/>
+            </a:pPr>
+            <a:r>
+              <a:rPr lang="en-US" dirty="0" err="1"/>
+              <a:t>logA</a:t>
+            </a:r>
+            <a:r>
+              <a:rPr lang="en-US" dirty="0"/>
+              <a:t> between c(-5,10) and </a:t>
+            </a:r>
+            <a:r>
+              <a:rPr lang="en-US" dirty="0" err="1"/>
+              <a:t>logB</a:t>
+            </a:r>
+            <a:r>
+              <a:rPr lang="en-US" dirty="0"/>
+              <a:t> between c(-15,0)</a:t>
+            </a:r>
+          </a:p>
+          <a:p>
+            <a:pPr marL="914400" lvl="1" indent="-457200">
+              <a:buFont typeface="+mj-lt"/>
+              <a:buAutoNum type="arabicPeriod"/>
+            </a:pPr>
+            <a:r>
+              <a:rPr lang="en-US" dirty="0"/>
+              <a:t>Use 100 steps for each (100.000 total </a:t>
+            </a:r>
+            <a:r>
+              <a:rPr lang="en-US" dirty="0" err="1"/>
+              <a:t>inits</a:t>
+            </a:r>
+            <a:r>
+              <a:rPr lang="en-US" dirty="0"/>
+              <a:t>)</a:t>
+            </a:r>
+          </a:p>
+          <a:p>
+            <a:pPr marL="914400" lvl="1" indent="-457200">
+              <a:buFont typeface="+mj-lt"/>
+              <a:buAutoNum type="arabicPeriod"/>
+            </a:pPr>
+            <a:r>
+              <a:rPr lang="en-US" dirty="0"/>
+              <a:t>Check they all find the same minimum</a:t>
+            </a:r>
+          </a:p>
+          <a:p>
+            <a:pPr marL="914400" lvl="1" indent="-457200">
+              <a:buFont typeface="+mj-lt"/>
+              <a:buAutoNum type="arabicPeriod"/>
+            </a:pPr>
+            <a:r>
+              <a:rPr lang="en-US" dirty="0"/>
+              <a:t>How much variation in # of </a:t>
+            </a:r>
+            <a:r>
+              <a:rPr lang="en-US" dirty="0" err="1"/>
+              <a:t>evals</a:t>
+            </a:r>
+            <a:r>
+              <a:rPr lang="en-US" dirty="0"/>
+              <a:t>?</a:t>
+            </a:r>
+          </a:p>
+          <a:p>
+            <a:pPr marL="0" indent="0">
+              <a:buNone/>
+            </a:pPr>
+            <a:endParaRPr lang="en-US" dirty="0"/>
+          </a:p>
+          <a:p>
+            <a:pPr marL="0" indent="0">
+              <a:buNone/>
+            </a:pPr>
+            <a:r>
+              <a:rPr lang="en-US" dirty="0"/>
+              <a:t>…. Review answers		</a:t>
+            </a:r>
+          </a:p>
+        </p:txBody>
+      </p:sp>
+    </p:spTree>
+    <p:extLst>
+      <p:ext uri="{BB962C8B-B14F-4D97-AF65-F5344CB8AC3E}">
+        <p14:creationId xmlns:p14="http://schemas.microsoft.com/office/powerpoint/2010/main" val="3198772232"/>
+      </p:ext>
+    </p:extLst>
+  </p:cSld>
+  <p:clrMapOvr>
+    <a:masterClrMapping/>
+  </p:clrMapOvr>
+</p:sld>
+</file>
+
+<file path=ppt/slides/slide6.xml><?xml version="1.0" encoding="utf-8"?>
+<p:sld xmlns:a="http://schemas.openxmlformats.org/drawingml/2006/main" xmlns:r="http://schemas.openxmlformats.org/officeDocument/2006/relationships" xmlns:p="http://schemas.openxmlformats.org/presentationml/2006/main">
+  <p:cSld>
+    <p:spTree>
+      <p:nvGrpSpPr>
+        <p:cNvPr id="1" name=""/>
+        <p:cNvGrpSpPr/>
+        <p:nvPr/>
+      </p:nvGrpSpPr>
+      <p:grpSpPr>
+        <a:xfrm>
+          <a:off x="0" y="0"/>
+          <a:ext cx="0" cy="0"/>
+          <a:chOff x="0" y="0"/>
+          <a:chExt cx="0" cy="0"/>
+        </a:xfrm>
+      </p:grpSpPr>
+      <p:sp>
+        <p:nvSpPr>
+          <p:cNvPr id="2" name="Title 1">
+            <a:extLst>
+              <a:ext uri="{FF2B5EF4-FFF2-40B4-BE49-F238E27FC236}">
+                <a16:creationId xmlns:a16="http://schemas.microsoft.com/office/drawing/2014/main" id="{8E0EE53A-651A-4D14-8ED8-844CD15A79D6}"/>
+              </a:ext>
+            </a:extLst>
+          </p:cNvPr>
+          <p:cNvSpPr>
+            <a:spLocks noGrp="1"/>
+          </p:cNvSpPr>
+          <p:nvPr>
+            <p:ph type="title"/>
+          </p:nvPr>
+        </p:nvSpPr>
+        <p:spPr/>
+        <p:txBody>
+          <a:bodyPr/>
+          <a:lstStyle/>
+          <a:p>
+            <a:r>
+              <a:rPr lang="en-US" dirty="0" err="1"/>
+              <a:t>Beverton</a:t>
+            </a:r>
+            <a:r>
+              <a:rPr lang="en-US" dirty="0"/>
               <a:t>-Hold Exercises #2 </a:t>
             </a:r>
           </a:p>
@@ -9246,7 +9675,7 @@
 </p:sld>
 </file>
 
-<file path=ppt/slides/slide6.xml><?xml version="1.0" encoding="utf-8"?>
+<file path=ppt/slides/slide7.xml><?xml version="1.0" encoding="utf-8"?>
 <p:sld xmlns:a="http://schemas.openxmlformats.org/drawingml/2006/main" xmlns:r="http://schemas.openxmlformats.org/officeDocument/2006/relationships" xmlns:p="http://schemas.openxmlformats.org/presentationml/2006/main">
   <p:cSld>
     <p:spTree>

</xml_diff>

<commit_message>
Finalize day 1 files
</commit_message>
<xml_diff>
--- a/day1/lab1_bevholt.pptx
+++ b/day1/lab1_bevholt.pptx
@@ -5,6 +5,9 @@
     <p:sldMasterId id="2147483672" r:id="rId1"/>
     <p:sldMasterId id="2147483690" r:id="rId2"/>
   </p:sldMasterIdLst>
+  <p:notesMasterIdLst>
+    <p:notesMasterId r:id="rId10"/>
+  </p:notesMasterIdLst>
   <p:sldIdLst>
     <p:sldId id="256" r:id="rId3"/>
     <p:sldId id="258" r:id="rId4"/>
@@ -123,6 +126,355 @@
 <p1510:revInfo xmlns:a="http://schemas.openxmlformats.org/drawingml/2006/main" xmlns:r="http://schemas.openxmlformats.org/officeDocument/2006/relationships" xmlns:p1510="http://schemas.microsoft.com/office/powerpoint/2015/10/main"/>
 </file>
 
+<file path=ppt/notesMasters/notesMaster1.xml><?xml version="1.0" encoding="utf-8"?>
+<p:notesMaster xmlns:a="http://schemas.openxmlformats.org/drawingml/2006/main" xmlns:r="http://schemas.openxmlformats.org/officeDocument/2006/relationships" xmlns:p="http://schemas.openxmlformats.org/presentationml/2006/main">
+  <p:cSld>
+    <p:bg>
+      <p:bgRef idx="1001">
+        <a:schemeClr val="bg1"/>
+      </p:bgRef>
+    </p:bg>
+    <p:spTree>
+      <p:nvGrpSpPr>
+        <p:cNvPr id="1" name=""/>
+        <p:cNvGrpSpPr/>
+        <p:nvPr/>
+      </p:nvGrpSpPr>
+      <p:grpSpPr>
+        <a:xfrm>
+          <a:off x="0" y="0"/>
+          <a:ext cx="0" cy="0"/>
+          <a:chOff x="0" y="0"/>
+          <a:chExt cx="0" cy="0"/>
+        </a:xfrm>
+      </p:grpSpPr>
+      <p:sp>
+        <p:nvSpPr>
+          <p:cNvPr id="2" name="Header Placeholder 1"/>
+          <p:cNvSpPr>
+            <a:spLocks noGrp="1"/>
+          </p:cNvSpPr>
+          <p:nvPr>
+            <p:ph type="hdr" sz="quarter"/>
+          </p:nvPr>
+        </p:nvSpPr>
+        <p:spPr>
+          <a:xfrm>
+            <a:off x="0" y="0"/>
+            <a:ext cx="2971800" cy="458788"/>
+          </a:xfrm>
+          <a:prstGeom prst="rect">
+            <a:avLst/>
+          </a:prstGeom>
+        </p:spPr>
+        <p:txBody>
+          <a:bodyPr vert="horz" lIns="91440" tIns="45720" rIns="91440" bIns="45720" rtlCol="0"/>
+          <a:lstStyle>
+            <a:lvl1pPr algn="l">
+              <a:defRPr sz="1200"/>
+            </a:lvl1pPr>
+          </a:lstStyle>
+          <a:p>
+            <a:endParaRPr lang="en-US"/>
+          </a:p>
+        </p:txBody>
+      </p:sp>
+      <p:sp>
+        <p:nvSpPr>
+          <p:cNvPr id="3" name="Date Placeholder 2"/>
+          <p:cNvSpPr>
+            <a:spLocks noGrp="1"/>
+          </p:cNvSpPr>
+          <p:nvPr>
+            <p:ph type="dt" idx="1"/>
+          </p:nvPr>
+        </p:nvSpPr>
+        <p:spPr>
+          <a:xfrm>
+            <a:off x="3884613" y="0"/>
+            <a:ext cx="2971800" cy="458788"/>
+          </a:xfrm>
+          <a:prstGeom prst="rect">
+            <a:avLst/>
+          </a:prstGeom>
+        </p:spPr>
+        <p:txBody>
+          <a:bodyPr vert="horz" lIns="91440" tIns="45720" rIns="91440" bIns="45720" rtlCol="0"/>
+          <a:lstStyle>
+            <a:lvl1pPr algn="r">
+              <a:defRPr sz="1200"/>
+            </a:lvl1pPr>
+          </a:lstStyle>
+          <a:p>
+            <a:fld id="{F2388989-7179-4868-8471-A7A056B96C7C}" type="datetimeFigureOut">
+              <a:rPr lang="en-US" smtClean="0"/>
+              <a:t>1/14/2018</a:t>
+            </a:fld>
+            <a:endParaRPr lang="en-US"/>
+          </a:p>
+        </p:txBody>
+      </p:sp>
+      <p:sp>
+        <p:nvSpPr>
+          <p:cNvPr id="4" name="Slide Image Placeholder 3"/>
+          <p:cNvSpPr>
+            <a:spLocks noGrp="1" noRot="1" noChangeAspect="1"/>
+          </p:cNvSpPr>
+          <p:nvPr>
+            <p:ph type="sldImg" idx="2"/>
+          </p:nvPr>
+        </p:nvSpPr>
+        <p:spPr>
+          <a:xfrm>
+            <a:off x="1371600" y="1143000"/>
+            <a:ext cx="4114800" cy="3086100"/>
+          </a:xfrm>
+          <a:prstGeom prst="rect">
+            <a:avLst/>
+          </a:prstGeom>
+          <a:noFill/>
+          <a:ln w="12700">
+            <a:solidFill>
+              <a:prstClr val="black"/>
+            </a:solidFill>
+          </a:ln>
+        </p:spPr>
+        <p:txBody>
+          <a:bodyPr vert="horz" lIns="91440" tIns="45720" rIns="91440" bIns="45720" rtlCol="0" anchor="ctr"/>
+          <a:lstStyle/>
+          <a:p>
+            <a:endParaRPr lang="en-US"/>
+          </a:p>
+        </p:txBody>
+      </p:sp>
+      <p:sp>
+        <p:nvSpPr>
+          <p:cNvPr id="5" name="Notes Placeholder 4"/>
+          <p:cNvSpPr>
+            <a:spLocks noGrp="1"/>
+          </p:cNvSpPr>
+          <p:nvPr>
+            <p:ph type="body" sz="quarter" idx="3"/>
+          </p:nvPr>
+        </p:nvSpPr>
+        <p:spPr>
+          <a:xfrm>
+            <a:off x="685800" y="4400550"/>
+            <a:ext cx="5486400" cy="3600450"/>
+          </a:xfrm>
+          <a:prstGeom prst="rect">
+            <a:avLst/>
+          </a:prstGeom>
+        </p:spPr>
+        <p:txBody>
+          <a:bodyPr vert="horz" lIns="91440" tIns="45720" rIns="91440" bIns="45720" rtlCol="0"/>
+          <a:lstStyle/>
+          <a:p>
+            <a:pPr lvl="0"/>
+            <a:r>
+              <a:rPr lang="en-US"/>
+              <a:t>Edit Master text styles</a:t>
+            </a:r>
+          </a:p>
+          <a:p>
+            <a:pPr lvl="1"/>
+            <a:r>
+              <a:rPr lang="en-US"/>
+              <a:t>Second level</a:t>
+            </a:r>
+          </a:p>
+          <a:p>
+            <a:pPr lvl="2"/>
+            <a:r>
+              <a:rPr lang="en-US"/>
+              <a:t>Third level</a:t>
+            </a:r>
+          </a:p>
+          <a:p>
+            <a:pPr lvl="3"/>
+            <a:r>
+              <a:rPr lang="en-US"/>
+              <a:t>Fourth level</a:t>
+            </a:r>
+          </a:p>
+          <a:p>
+            <a:pPr lvl="4"/>
+            <a:r>
+              <a:rPr lang="en-US"/>
+              <a:t>Fifth level</a:t>
+            </a:r>
+          </a:p>
+        </p:txBody>
+      </p:sp>
+      <p:sp>
+        <p:nvSpPr>
+          <p:cNvPr id="6" name="Footer Placeholder 5"/>
+          <p:cNvSpPr>
+            <a:spLocks noGrp="1"/>
+          </p:cNvSpPr>
+          <p:nvPr>
+            <p:ph type="ftr" sz="quarter" idx="4"/>
+          </p:nvPr>
+        </p:nvSpPr>
+        <p:spPr>
+          <a:xfrm>
+            <a:off x="0" y="8685213"/>
+            <a:ext cx="2971800" cy="458787"/>
+          </a:xfrm>
+          <a:prstGeom prst="rect">
+            <a:avLst/>
+          </a:prstGeom>
+        </p:spPr>
+        <p:txBody>
+          <a:bodyPr vert="horz" lIns="91440" tIns="45720" rIns="91440" bIns="45720" rtlCol="0" anchor="b"/>
+          <a:lstStyle>
+            <a:lvl1pPr algn="l">
+              <a:defRPr sz="1200"/>
+            </a:lvl1pPr>
+          </a:lstStyle>
+          <a:p>
+            <a:endParaRPr lang="en-US"/>
+          </a:p>
+        </p:txBody>
+      </p:sp>
+      <p:sp>
+        <p:nvSpPr>
+          <p:cNvPr id="7" name="Slide Number Placeholder 6"/>
+          <p:cNvSpPr>
+            <a:spLocks noGrp="1"/>
+          </p:cNvSpPr>
+          <p:nvPr>
+            <p:ph type="sldNum" sz="quarter" idx="5"/>
+          </p:nvPr>
+        </p:nvSpPr>
+        <p:spPr>
+          <a:xfrm>
+            <a:off x="3884613" y="8685213"/>
+            <a:ext cx="2971800" cy="458787"/>
+          </a:xfrm>
+          <a:prstGeom prst="rect">
+            <a:avLst/>
+          </a:prstGeom>
+        </p:spPr>
+        <p:txBody>
+          <a:bodyPr vert="horz" lIns="91440" tIns="45720" rIns="91440" bIns="45720" rtlCol="0" anchor="b"/>
+          <a:lstStyle>
+            <a:lvl1pPr algn="r">
+              <a:defRPr sz="1200"/>
+            </a:lvl1pPr>
+          </a:lstStyle>
+          <a:p>
+            <a:fld id="{F0734522-EE3F-4B6E-889D-D7CB059A2AE4}" type="slidenum">
+              <a:rPr lang="en-US" smtClean="0"/>
+              <a:t>‹#›</a:t>
+            </a:fld>
+            <a:endParaRPr lang="en-US"/>
+          </a:p>
+        </p:txBody>
+      </p:sp>
+    </p:spTree>
+    <p:extLst>
+      <p:ext uri="{BB962C8B-B14F-4D97-AF65-F5344CB8AC3E}">
+        <p14:creationId xmlns:p14="http://schemas.microsoft.com/office/powerpoint/2010/main" val="3393239692"/>
+      </p:ext>
+    </p:extLst>
+  </p:cSld>
+  <p:clrMap bg1="lt1" tx1="dk1" bg2="lt2" tx2="dk2" accent1="accent1" accent2="accent2" accent3="accent3" accent4="accent4" accent5="accent5" accent6="accent6" hlink="hlink" folHlink="folHlink"/>
+  <p:notesStyle>
+    <a:lvl1pPr marL="0" algn="l" defTabSz="914400" rtl="0" eaLnBrk="1" latinLnBrk="0" hangingPunct="1">
+      <a:defRPr sz="1200" kern="1200">
+        <a:solidFill>
+          <a:schemeClr val="tx1"/>
+        </a:solidFill>
+        <a:latin typeface="+mn-lt"/>
+        <a:ea typeface="+mn-ea"/>
+        <a:cs typeface="+mn-cs"/>
+      </a:defRPr>
+    </a:lvl1pPr>
+    <a:lvl2pPr marL="457200" algn="l" defTabSz="914400" rtl="0" eaLnBrk="1" latinLnBrk="0" hangingPunct="1">
+      <a:defRPr sz="1200" kern="1200">
+        <a:solidFill>
+          <a:schemeClr val="tx1"/>
+        </a:solidFill>
+        <a:latin typeface="+mn-lt"/>
+        <a:ea typeface="+mn-ea"/>
+        <a:cs typeface="+mn-cs"/>
+      </a:defRPr>
+    </a:lvl2pPr>
+    <a:lvl3pPr marL="914400" algn="l" defTabSz="914400" rtl="0" eaLnBrk="1" latinLnBrk="0" hangingPunct="1">
+      <a:defRPr sz="1200" kern="1200">
+        <a:solidFill>
+          <a:schemeClr val="tx1"/>
+        </a:solidFill>
+        <a:latin typeface="+mn-lt"/>
+        <a:ea typeface="+mn-ea"/>
+        <a:cs typeface="+mn-cs"/>
+      </a:defRPr>
+    </a:lvl3pPr>
+    <a:lvl4pPr marL="1371600" algn="l" defTabSz="914400" rtl="0" eaLnBrk="1" latinLnBrk="0" hangingPunct="1">
+      <a:defRPr sz="1200" kern="1200">
+        <a:solidFill>
+          <a:schemeClr val="tx1"/>
+        </a:solidFill>
+        <a:latin typeface="+mn-lt"/>
+        <a:ea typeface="+mn-ea"/>
+        <a:cs typeface="+mn-cs"/>
+      </a:defRPr>
+    </a:lvl4pPr>
+    <a:lvl5pPr marL="1828800" algn="l" defTabSz="914400" rtl="0" eaLnBrk="1" latinLnBrk="0" hangingPunct="1">
+      <a:defRPr sz="1200" kern="1200">
+        <a:solidFill>
+          <a:schemeClr val="tx1"/>
+        </a:solidFill>
+        <a:latin typeface="+mn-lt"/>
+        <a:ea typeface="+mn-ea"/>
+        <a:cs typeface="+mn-cs"/>
+      </a:defRPr>
+    </a:lvl5pPr>
+    <a:lvl6pPr marL="2286000" algn="l" defTabSz="914400" rtl="0" eaLnBrk="1" latinLnBrk="0" hangingPunct="1">
+      <a:defRPr sz="1200" kern="1200">
+        <a:solidFill>
+          <a:schemeClr val="tx1"/>
+        </a:solidFill>
+        <a:latin typeface="+mn-lt"/>
+        <a:ea typeface="+mn-ea"/>
+        <a:cs typeface="+mn-cs"/>
+      </a:defRPr>
+    </a:lvl6pPr>
+    <a:lvl7pPr marL="2743200" algn="l" defTabSz="914400" rtl="0" eaLnBrk="1" latinLnBrk="0" hangingPunct="1">
+      <a:defRPr sz="1200" kern="1200">
+        <a:solidFill>
+          <a:schemeClr val="tx1"/>
+        </a:solidFill>
+        <a:latin typeface="+mn-lt"/>
+        <a:ea typeface="+mn-ea"/>
+        <a:cs typeface="+mn-cs"/>
+      </a:defRPr>
+    </a:lvl7pPr>
+    <a:lvl8pPr marL="3200400" algn="l" defTabSz="914400" rtl="0" eaLnBrk="1" latinLnBrk="0" hangingPunct="1">
+      <a:defRPr sz="1200" kern="1200">
+        <a:solidFill>
+          <a:schemeClr val="tx1"/>
+        </a:solidFill>
+        <a:latin typeface="+mn-lt"/>
+        <a:ea typeface="+mn-ea"/>
+        <a:cs typeface="+mn-cs"/>
+      </a:defRPr>
+    </a:lvl8pPr>
+    <a:lvl9pPr marL="3657600" algn="l" defTabSz="914400" rtl="0" eaLnBrk="1" latinLnBrk="0" hangingPunct="1">
+      <a:defRPr sz="1200" kern="1200">
+        <a:solidFill>
+          <a:schemeClr val="tx1"/>
+        </a:solidFill>
+        <a:latin typeface="+mn-lt"/>
+        <a:ea typeface="+mn-ea"/>
+        <a:cs typeface="+mn-cs"/>
+      </a:defRPr>
+    </a:lvl9pPr>
+  </p:notesStyle>
+</p:notesMaster>
+</file>
+
 <file path=ppt/slideLayouts/slideLayout1.xml><?xml version="1.0" encoding="utf-8"?>
 <p:sldLayout xmlns:a="http://schemas.openxmlformats.org/drawingml/2006/main" xmlns:r="http://schemas.openxmlformats.org/officeDocument/2006/relationships" xmlns:p="http://schemas.openxmlformats.org/presentationml/2006/main" showMasterSp="0" type="title" preserve="1">
   <p:cSld name="Title Slide">
@@ -205,7 +557,7 @@
           </a:ln>
           <a:extLst>
             <a:ext uri="{909E8E84-426E-40dd-AFC4-6F175D3DCCD1}">
-              <a14:hiddenFill xmlns="" xmlns:a14="http://schemas.microsoft.com/office/drawing/2010/main">
+              <a14:hiddenFill xmlns:a14="http://schemas.microsoft.com/office/drawing/2010/main" xmlns="">
                 <a:solidFill>
                   <a:srgbClr val="FFFFFF"/>
                 </a:solidFill>
@@ -248,7 +600,7 @@
           </a:ln>
           <a:extLst>
             <a:ext uri="{909E8E84-426E-40dd-AFC4-6F175D3DCCD1}">
-              <a14:hiddenFill xmlns="" xmlns:a14="http://schemas.microsoft.com/office/drawing/2010/main">
+              <a14:hiddenFill xmlns:a14="http://schemas.microsoft.com/office/drawing/2010/main" xmlns="">
                 <a:noFill/>
               </a14:hiddenFill>
             </a:ext>
@@ -345,7 +697,7 @@
             </a:lvl1pPr>
           </a:lstStyle>
           <a:p>
-            <a:fld id="{7A8D528A-DECC-49A5-98E7-F9D465B88842}" type="datetimeFigureOut">
+            <a:fld id="{473094AD-038C-43A2-A4DE-BB0813E6E51E}" type="datetime1">
               <a:rPr lang="en-US" smtClean="0"/>
               <a:t>1/14/2018</a:t>
             </a:fld>
@@ -532,7 +884,7 @@
             </a:lvl1pPr>
           </a:lstStyle>
           <a:p>
-            <a:fld id="{7A8D528A-DECC-49A5-98E7-F9D465B88842}" type="datetimeFigureOut">
+            <a:fld id="{1F0E199C-061B-4949-9C96-AC248C0D8DD3}" type="datetime1">
               <a:rPr lang="en-US" smtClean="0"/>
               <a:t>1/14/2018</a:t>
             </a:fld>
@@ -728,7 +1080,7 @@
             </a:lvl1pPr>
           </a:lstStyle>
           <a:p>
-            <a:fld id="{7A8D528A-DECC-49A5-98E7-F9D465B88842}" type="datetimeFigureOut">
+            <a:fld id="{EF845CA7-EB4A-4003-96F7-46C5013AEA42}" type="datetime1">
               <a:rPr lang="en-US" smtClean="0"/>
               <a:t>1/14/2018</a:t>
             </a:fld>
@@ -980,7 +1332,7 @@
             </a:lvl1pPr>
           </a:lstStyle>
           <a:p>
-            <a:fld id="{7A8D528A-DECC-49A5-98E7-F9D465B88842}" type="datetimeFigureOut">
+            <a:fld id="{2D858B87-F135-4381-8E7E-B64D4228932C}" type="datetime1">
               <a:rPr lang="en-US" smtClean="0"/>
               <a:t>1/14/2018</a:t>
             </a:fld>
@@ -1204,7 +1556,7 @@
             </a:lvl1pPr>
           </a:lstStyle>
           <a:p>
-            <a:fld id="{7A8D528A-DECC-49A5-98E7-F9D465B88842}" type="datetimeFigureOut">
+            <a:fld id="{3B3C5764-E191-4322-8BA3-3D7CBE2CF8D1}" type="datetime1">
               <a:rPr lang="en-US" smtClean="0"/>
               <a:t>1/14/2018</a:t>
             </a:fld>
@@ -1512,7 +1864,7 @@
             </a:lvl1pPr>
           </a:lstStyle>
           <a:p>
-            <a:fld id="{7A8D528A-DECC-49A5-98E7-F9D465B88842}" type="datetimeFigureOut">
+            <a:fld id="{CCFF9CC7-9DD7-495E-8E0C-D2152E7ED385}" type="datetime1">
               <a:rPr lang="en-US" smtClean="0"/>
               <a:t>1/14/2018</a:t>
             </a:fld>
@@ -1680,7 +2032,7 @@
             </a:lvl1pPr>
           </a:lstStyle>
           <a:p>
-            <a:fld id="{7A8D528A-DECC-49A5-98E7-F9D465B88842}" type="datetimeFigureOut">
+            <a:fld id="{7AF3F41F-A6FA-40C5-99E0-3F86C98F6608}" type="datetime1">
               <a:rPr lang="en-US" smtClean="0"/>
               <a:t>1/14/2018</a:t>
             </a:fld>
@@ -1992,7 +2344,7 @@
             </a:lvl1pPr>
           </a:lstStyle>
           <a:p>
-            <a:fld id="{7A8D528A-DECC-49A5-98E7-F9D465B88842}" type="datetimeFigureOut">
+            <a:fld id="{9620DF9F-793E-4985-B9D8-992C6E2DA332}" type="datetime1">
               <a:rPr lang="en-US" smtClean="0"/>
               <a:t>1/14/2018</a:t>
             </a:fld>
@@ -2304,7 +2656,7 @@
             </a:lvl1pPr>
           </a:lstStyle>
           <a:p>
-            <a:fld id="{7A8D528A-DECC-49A5-98E7-F9D465B88842}" type="datetimeFigureOut">
+            <a:fld id="{796EA9D4-2AD1-4101-A286-77D37AAADFED}" type="datetime1">
               <a:rPr lang="en-US" smtClean="0"/>
               <a:t>1/14/2018</a:t>
             </a:fld>
@@ -2524,7 +2876,7 @@
           <a:bodyPr/>
           <a:lstStyle/>
           <a:p>
-            <a:fld id="{BA23EE8D-9CE0-4F42-A40F-E28604EA7175}" type="datetime1">
+            <a:fld id="{2BD0993A-8691-4A87-9C49-3CE884C47D45}" type="datetime1">
               <a:rPr lang="en-US" smtClean="0"/>
               <a:t>1/14/2018</a:t>
             </a:fld>
@@ -2722,7 +3074,7 @@
           <a:bodyPr/>
           <a:lstStyle/>
           <a:p>
-            <a:fld id="{1A4DAFB5-4EEC-49BD-AB33-559CD6F558E3}" type="datetime1">
+            <a:fld id="{BF316B00-A11D-4D80-BD0B-755A2969FF78}" type="datetime1">
               <a:rPr lang="en-US" smtClean="0"/>
               <a:t>1/14/2018</a:t>
             </a:fld>
@@ -2908,7 +3260,7 @@
             </a:lvl1pPr>
           </a:lstStyle>
           <a:p>
-            <a:fld id="{7A8D528A-DECC-49A5-98E7-F9D465B88842}" type="datetimeFigureOut">
+            <a:fld id="{FB49576D-E9F4-42BB-BC13-B23B3C4B0843}" type="datetime1">
               <a:rPr lang="en-US" smtClean="0"/>
               <a:t>1/14/2018</a:t>
             </a:fld>
@@ -3183,7 +3535,7 @@
           <a:bodyPr/>
           <a:lstStyle/>
           <a:p>
-            <a:fld id="{1EE2056D-DC17-4607-87F9-EA4937BD48E2}" type="datetime1">
+            <a:fld id="{C79C30F5-8523-4EB9-ACC0-9A01E3FEDA29}" type="datetime1">
               <a:rPr lang="en-US" smtClean="0"/>
               <a:t>1/14/2018</a:t>
             </a:fld>
@@ -3448,7 +3800,7 @@
           <a:bodyPr/>
           <a:lstStyle/>
           <a:p>
-            <a:fld id="{866E3DAD-9254-43DE-A1F3-F1D56B1E5B5F}" type="datetime1">
+            <a:fld id="{31EA960D-B428-435A-A5E7-264A6D063906}" type="datetime1">
               <a:rPr lang="en-US" smtClean="0"/>
               <a:t>1/14/2018</a:t>
             </a:fld>
@@ -3860,7 +4212,7 @@
           <a:bodyPr/>
           <a:lstStyle/>
           <a:p>
-            <a:fld id="{12F88D45-78A7-46A0-99B7-2046E351D366}" type="datetime1">
+            <a:fld id="{3C27B052-FF7D-466F-9234-659183862C88}" type="datetime1">
               <a:rPr lang="en-US" smtClean="0"/>
               <a:t>1/14/2018</a:t>
             </a:fld>
@@ -4001,7 +4353,7 @@
           <a:bodyPr/>
           <a:lstStyle/>
           <a:p>
-            <a:fld id="{7716AC84-6778-466F-95F9-3EEE8E306ABF}" type="datetime1">
+            <a:fld id="{30E86C0C-8755-49A7-BEFB-7AA12254EBB9}" type="datetime1">
               <a:rPr lang="en-US" smtClean="0"/>
               <a:t>1/14/2018</a:t>
             </a:fld>
@@ -4114,7 +4466,7 @@
           <a:bodyPr/>
           <a:lstStyle/>
           <a:p>
-            <a:fld id="{02DEDAFE-CBEF-41E8-868F-E40C867A5636}" type="datetime1">
+            <a:fld id="{E8B48827-F8F9-4844-A257-9CA23F7E0DA1}" type="datetime1">
               <a:rPr lang="en-US" smtClean="0"/>
               <a:t>1/14/2018</a:t>
             </a:fld>
@@ -4425,7 +4777,7 @@
           <a:bodyPr/>
           <a:lstStyle/>
           <a:p>
-            <a:fld id="{20C87E4D-F358-4436-A283-114607D95274}" type="datetime1">
+            <a:fld id="{EE8BAE2C-037A-4C2F-87D7-09EE32575BC5}" type="datetime1">
               <a:rPr lang="en-US" smtClean="0"/>
               <a:t>1/14/2018</a:t>
             </a:fld>
@@ -4716,7 +5068,7 @@
           <a:bodyPr/>
           <a:lstStyle/>
           <a:p>
-            <a:fld id="{6CCABA82-8A7B-4924-987B-0B7221667B17}" type="datetime1">
+            <a:fld id="{33BA7458-4B9B-4BD7-9049-0CDF114B9A90}" type="datetime1">
               <a:rPr lang="en-US" smtClean="0"/>
               <a:t>1/14/2018</a:t>
             </a:fld>
@@ -4914,7 +5266,7 @@
           <a:bodyPr/>
           <a:lstStyle/>
           <a:p>
-            <a:fld id="{C602C5EE-1F52-440A-B21D-CF34717184B1}" type="datetime1">
+            <a:fld id="{5F138F74-D09C-4A4F-9011-F5861002FF66}" type="datetime1">
               <a:rPr lang="en-US" smtClean="0"/>
               <a:t>1/14/2018</a:t>
             </a:fld>
@@ -5122,7 +5474,7 @@
           <a:bodyPr/>
           <a:lstStyle/>
           <a:p>
-            <a:fld id="{88EA7AC3-3927-460F-BC0A-B8263F635273}" type="datetime1">
+            <a:fld id="{B023AC82-5023-4B40-8E7B-CB32645BA3C1}" type="datetime1">
               <a:rPr lang="en-US" smtClean="0"/>
               <a:t>1/14/2018</a:t>
             </a:fld>
@@ -5331,7 +5683,7 @@
             </a:lvl1pPr>
           </a:lstStyle>
           <a:p>
-            <a:fld id="{7A8D528A-DECC-49A5-98E7-F9D465B88842}" type="datetimeFigureOut">
+            <a:fld id="{CB9270DE-3C8A-43D2-B05F-DCE66535FA1A}" type="datetime1">
               <a:rPr lang="en-US" smtClean="0"/>
               <a:t>1/14/2018</a:t>
             </a:fld>
@@ -5634,7 +5986,7 @@
             </a:lvl1pPr>
           </a:lstStyle>
           <a:p>
-            <a:fld id="{7A8D528A-DECC-49A5-98E7-F9D465B88842}" type="datetimeFigureOut">
+            <a:fld id="{5F9A8E4F-B453-4822-A448-33EE436F9AB4}" type="datetime1">
               <a:rPr lang="en-US" smtClean="0"/>
               <a:t>1/14/2018</a:t>
             </a:fld>
@@ -6076,7 +6428,7 @@
             </a:lvl1pPr>
           </a:lstStyle>
           <a:p>
-            <a:fld id="{7A8D528A-DECC-49A5-98E7-F9D465B88842}" type="datetimeFigureOut">
+            <a:fld id="{F917497C-C63C-412A-9DFD-A2E04718E293}" type="datetime1">
               <a:rPr lang="en-US" smtClean="0"/>
               <a:t>1/14/2018</a:t>
             </a:fld>
@@ -6211,7 +6563,7 @@
             </a:lvl1pPr>
           </a:lstStyle>
           <a:p>
-            <a:fld id="{7A8D528A-DECC-49A5-98E7-F9D465B88842}" type="datetimeFigureOut">
+            <a:fld id="{F6E66BCC-7079-4559-85D5-50A66D933026}" type="datetime1">
               <a:rPr lang="en-US" smtClean="0"/>
               <a:t>1/14/2018</a:t>
             </a:fld>
@@ -6324,7 +6676,7 @@
             </a:lvl1pPr>
           </a:lstStyle>
           <a:p>
-            <a:fld id="{7A8D528A-DECC-49A5-98E7-F9D465B88842}" type="datetimeFigureOut">
+            <a:fld id="{6B4C6DDB-E43F-4445-B916-EA8EF73BA2E9}" type="datetime1">
               <a:rPr lang="en-US" smtClean="0"/>
               <a:t>1/14/2018</a:t>
             </a:fld>
@@ -6617,7 +6969,7 @@
             </a:lvl1pPr>
           </a:lstStyle>
           <a:p>
-            <a:fld id="{7A8D528A-DECC-49A5-98E7-F9D465B88842}" type="datetimeFigureOut">
+            <a:fld id="{28A0BF00-D669-4C78-910C-5733C04ABD2D}" type="datetime1">
               <a:rPr lang="en-US" smtClean="0"/>
               <a:t>1/14/2018</a:t>
             </a:fld>
@@ -6891,7 +7243,7 @@
             </a:lvl1pPr>
           </a:lstStyle>
           <a:p>
-            <a:fld id="{7A8D528A-DECC-49A5-98E7-F9D465B88842}" type="datetimeFigureOut">
+            <a:fld id="{1D17FF70-BB30-46BB-AA76-2B519CE88675}" type="datetime1">
               <a:rPr lang="en-US" smtClean="0"/>
               <a:t>1/14/2018</a:t>
             </a:fld>
@@ -7015,17 +7367,17 @@
           </a:ln>
           <a:extLst>
             <a:ext uri="{FAA26D3D-D897-4be2-8F04-BA451C77F1D7}">
-              <ma14:placeholderFlag xmlns="" xmlns:ma14="http://schemas.microsoft.com/office/mac/drawingml/2011/main" val="1"/>
+              <ma14:placeholderFlag xmlns:ma14="http://schemas.microsoft.com/office/mac/drawingml/2011/main" xmlns="" val="1"/>
             </a:ext>
             <a:ext uri="{909E8E84-426E-40dd-AFC4-6F175D3DCCD1}">
-              <a14:hiddenFill xmlns="" xmlns:a14="http://schemas.microsoft.com/office/drawing/2010/main">
+              <a14:hiddenFill xmlns:a14="http://schemas.microsoft.com/office/drawing/2010/main" xmlns="">
                 <a:solidFill>
                   <a:srgbClr val="FFFFFF"/>
                 </a:solidFill>
               </a14:hiddenFill>
             </a:ext>
             <a:ext uri="{91240B29-F687-4f45-9708-019B960494DF}">
-              <a14:hiddenLine xmlns="" xmlns:a14="http://schemas.microsoft.com/office/drawing/2010/main" w="9525">
+              <a14:hiddenLine xmlns:a14="http://schemas.microsoft.com/office/drawing/2010/main" xmlns="" w="9525">
                 <a:solidFill>
                   <a:srgbClr val="000000"/>
                 </a:solidFill>
@@ -7077,17 +7429,17 @@
           </a:ln>
           <a:extLst>
             <a:ext uri="{FAA26D3D-D897-4be2-8F04-BA451C77F1D7}">
-              <ma14:placeholderFlag xmlns="" xmlns:ma14="http://schemas.microsoft.com/office/mac/drawingml/2011/main" val="1"/>
+              <ma14:placeholderFlag xmlns:ma14="http://schemas.microsoft.com/office/mac/drawingml/2011/main" xmlns="" val="1"/>
             </a:ext>
             <a:ext uri="{909E8E84-426E-40dd-AFC4-6F175D3DCCD1}">
-              <a14:hiddenFill xmlns="" xmlns:a14="http://schemas.microsoft.com/office/drawing/2010/main">
+              <a14:hiddenFill xmlns:a14="http://schemas.microsoft.com/office/drawing/2010/main" xmlns="">
                 <a:solidFill>
                   <a:srgbClr val="FFFFFF"/>
                 </a:solidFill>
               </a14:hiddenFill>
             </a:ext>
             <a:ext uri="{91240B29-F687-4f45-9708-019B960494DF}">
-              <a14:hiddenLine xmlns="" xmlns:a14="http://schemas.microsoft.com/office/drawing/2010/main" w="9525">
+              <a14:hiddenLine xmlns:a14="http://schemas.microsoft.com/office/drawing/2010/main" xmlns="" w="9525">
                 <a:solidFill>
                   <a:srgbClr val="000000"/>
                 </a:solidFill>
@@ -7185,7 +7537,7 @@
             </a:lvl1pPr>
           </a:lstStyle>
           <a:p>
-            <a:fld id="{7A8D528A-DECC-49A5-98E7-F9D465B88842}" type="datetimeFigureOut">
+            <a:fld id="{793CCD87-1551-4F91-BE02-F4A09E617739}" type="datetime1">
               <a:rPr lang="en-US" smtClean="0"/>
               <a:t>1/14/2018</a:t>
             </a:fld>
@@ -7355,7 +7707,7 @@
           </a:ln>
           <a:extLst>
             <a:ext uri="{909E8E84-426E-40dd-AFC4-6F175D3DCCD1}">
-              <a14:hiddenFill xmlns="" xmlns:a14="http://schemas.microsoft.com/office/drawing/2010/main">
+              <a14:hiddenFill xmlns:a14="http://schemas.microsoft.com/office/drawing/2010/main" xmlns="">
                 <a:solidFill>
                   <a:srgbClr val="FFFFFF"/>
                 </a:solidFill>
@@ -7398,7 +7750,7 @@
           </a:ln>
           <a:extLst>
             <a:ext uri="{909E8E84-426E-40dd-AFC4-6F175D3DCCD1}">
-              <a14:hiddenFill xmlns="" xmlns:a14="http://schemas.microsoft.com/office/drawing/2010/main">
+              <a14:hiddenFill xmlns:a14="http://schemas.microsoft.com/office/drawing/2010/main" xmlns="">
                 <a:noFill/>
               </a14:hiddenFill>
             </a:ext>
@@ -7439,6 +7791,7 @@
     <p:sldLayoutId id="2147483688" r:id="rId16"/>
     <p:sldLayoutId id="2147483689" r:id="rId17"/>
   </p:sldLayoutIdLst>
+  <p:hf hdr="0" ftr="0" dt="0"/>
   <p:txStyles>
     <p:titleStyle>
       <a:lvl1pPr algn="l" rtl="0" eaLnBrk="1" fontAlgn="base" hangingPunct="1">
@@ -8031,7 +8384,7 @@
             </a:lvl1pPr>
           </a:lstStyle>
           <a:p>
-            <a:fld id="{A7853F80-D63E-429F-B326-B00475E1D8E8}" type="datetime1">
+            <a:fld id="{FBD26717-3E2A-491D-9A2B-0D747605CA1D}" type="datetime1">
               <a:rPr lang="en-US" smtClean="0"/>
               <a:t>1/14/2018</a:t>
             </a:fld>
@@ -8504,6 +8857,35 @@
           </a:p>
         </p:txBody>
       </p:sp>
+      <p:sp>
+        <p:nvSpPr>
+          <p:cNvPr id="4" name="Slide Number Placeholder 3">
+            <a:extLst>
+              <a:ext uri="{FF2B5EF4-FFF2-40B4-BE49-F238E27FC236}">
+                <a16:creationId xmlns:a16="http://schemas.microsoft.com/office/drawing/2014/main" id="{7D8A9E04-9745-4BF1-8EB3-4254B3A8606B}"/>
+              </a:ext>
+            </a:extLst>
+          </p:cNvPr>
+          <p:cNvSpPr>
+            <a:spLocks noGrp="1"/>
+          </p:cNvSpPr>
+          <p:nvPr>
+            <p:ph type="sldNum" sz="quarter" idx="12"/>
+          </p:nvPr>
+        </p:nvSpPr>
+        <p:spPr/>
+        <p:txBody>
+          <a:bodyPr/>
+          <a:lstStyle/>
+          <a:p>
+            <a:fld id="{36417F31-DB7E-41E3-9A04-DC9BB348C608}" type="slidenum">
+              <a:rPr lang="en-US" smtClean="0"/>
+              <a:t>1</a:t>
+            </a:fld>
+            <a:endParaRPr lang="en-US"/>
+          </a:p>
+        </p:txBody>
+      </p:sp>
     </p:spTree>
     <p:extLst>
       <p:ext uri="{BB962C8B-B14F-4D97-AF65-F5344CB8AC3E}">
@@ -8655,7 +9037,7 @@
           <a:graphicData uri="http://schemas.openxmlformats.org/presentationml/2006/ole">
             <mc:AlternateContent xmlns:mc="http://schemas.openxmlformats.org/markup-compatibility/2006">
               <mc:Choice xmlns:v="urn:schemas-microsoft-com:vml" Requires="v">
-                <p:oleObj spid="_x0000_s1035" name="Equation" r:id="rId3" imgW="2692080" imgH="634680" progId="Equation.DSMT4">
+                <p:oleObj spid="_x0000_s1036" name="Equation" r:id="rId3" imgW="2692080" imgH="634680" progId="Equation.DSMT4">
                   <p:embed/>
                 </p:oleObj>
               </mc:Choice>
@@ -8696,6 +9078,35 @@
           </a:graphicData>
         </a:graphic>
       </p:graphicFrame>
+      <p:sp>
+        <p:nvSpPr>
+          <p:cNvPr id="5" name="Slide Number Placeholder 4">
+            <a:extLst>
+              <a:ext uri="{FF2B5EF4-FFF2-40B4-BE49-F238E27FC236}">
+                <a16:creationId xmlns:a16="http://schemas.microsoft.com/office/drawing/2014/main" id="{14EAA114-0ABF-49C8-A1AD-423E96F74D30}"/>
+              </a:ext>
+            </a:extLst>
+          </p:cNvPr>
+          <p:cNvSpPr>
+            <a:spLocks noGrp="1"/>
+          </p:cNvSpPr>
+          <p:nvPr>
+            <p:ph type="sldNum" sz="quarter" idx="12"/>
+          </p:nvPr>
+        </p:nvSpPr>
+        <p:spPr/>
+        <p:txBody>
+          <a:bodyPr/>
+          <a:lstStyle/>
+          <a:p>
+            <a:fld id="{36417F31-DB7E-41E3-9A04-DC9BB348C608}" type="slidenum">
+              <a:rPr lang="en-US" smtClean="0"/>
+              <a:t>2</a:t>
+            </a:fld>
+            <a:endParaRPr lang="en-US"/>
+          </a:p>
+        </p:txBody>
+      </p:sp>
     </p:spTree>
     <p:extLst>
       <p:ext uri="{BB962C8B-B14F-4D97-AF65-F5344CB8AC3E}">
@@ -8788,6 +9199,35 @@
           </a:p>
         </p:txBody>
       </p:sp>
+      <p:sp>
+        <p:nvSpPr>
+          <p:cNvPr id="4" name="Slide Number Placeholder 3">
+            <a:extLst>
+              <a:ext uri="{FF2B5EF4-FFF2-40B4-BE49-F238E27FC236}">
+                <a16:creationId xmlns:a16="http://schemas.microsoft.com/office/drawing/2014/main" id="{037B065C-B760-4D49-8D23-63CFDB9A9DD4}"/>
+              </a:ext>
+            </a:extLst>
+          </p:cNvPr>
+          <p:cNvSpPr>
+            <a:spLocks noGrp="1"/>
+          </p:cNvSpPr>
+          <p:nvPr>
+            <p:ph type="sldNum" sz="quarter" idx="12"/>
+          </p:nvPr>
+        </p:nvSpPr>
+        <p:spPr/>
+        <p:txBody>
+          <a:bodyPr/>
+          <a:lstStyle/>
+          <a:p>
+            <a:fld id="{36417F31-DB7E-41E3-9A04-DC9BB348C608}" type="slidenum">
+              <a:rPr lang="en-US" smtClean="0"/>
+              <a:t>3</a:t>
+            </a:fld>
+            <a:endParaRPr lang="en-US"/>
+          </a:p>
+        </p:txBody>
+      </p:sp>
     </p:spTree>
     <p:extLst>
       <p:ext uri="{BB962C8B-B14F-4D97-AF65-F5344CB8AC3E}">
@@ -9216,6 +9656,35 @@
           </a:p>
         </p:txBody>
       </p:sp>
+      <p:sp>
+        <p:nvSpPr>
+          <p:cNvPr id="2" name="Slide Number Placeholder 1">
+            <a:extLst>
+              <a:ext uri="{FF2B5EF4-FFF2-40B4-BE49-F238E27FC236}">
+                <a16:creationId xmlns:a16="http://schemas.microsoft.com/office/drawing/2014/main" id="{73564944-CBC5-4B36-8907-8268BA870352}"/>
+              </a:ext>
+            </a:extLst>
+          </p:cNvPr>
+          <p:cNvSpPr>
+            <a:spLocks noGrp="1"/>
+          </p:cNvSpPr>
+          <p:nvPr>
+            <p:ph type="sldNum" sz="quarter" idx="12"/>
+          </p:nvPr>
+        </p:nvSpPr>
+        <p:spPr/>
+        <p:txBody>
+          <a:bodyPr/>
+          <a:lstStyle/>
+          <a:p>
+            <a:fld id="{A90099C9-4CB8-9A40-B745-9AB270505907}" type="slidenum">
+              <a:rPr lang="en-US" smtClean="0"/>
+              <a:t>4</a:t>
+            </a:fld>
+            <a:endParaRPr lang="en-US"/>
+          </a:p>
+        </p:txBody>
+      </p:sp>
     </p:spTree>
     <p:extLst>
       <p:ext uri="{BB962C8B-B14F-4D97-AF65-F5344CB8AC3E}">
@@ -9410,6 +9879,35 @@
           </a:p>
         </p:txBody>
       </p:sp>
+      <p:sp>
+        <p:nvSpPr>
+          <p:cNvPr id="4" name="Slide Number Placeholder 3">
+            <a:extLst>
+              <a:ext uri="{FF2B5EF4-FFF2-40B4-BE49-F238E27FC236}">
+                <a16:creationId xmlns:a16="http://schemas.microsoft.com/office/drawing/2014/main" id="{FB13210D-F4BF-478A-BF3A-8929098C1397}"/>
+              </a:ext>
+            </a:extLst>
+          </p:cNvPr>
+          <p:cNvSpPr>
+            <a:spLocks noGrp="1"/>
+          </p:cNvSpPr>
+          <p:nvPr>
+            <p:ph type="sldNum" sz="quarter" idx="12"/>
+          </p:nvPr>
+        </p:nvSpPr>
+        <p:spPr/>
+        <p:txBody>
+          <a:bodyPr/>
+          <a:lstStyle/>
+          <a:p>
+            <a:fld id="{36417F31-DB7E-41E3-9A04-DC9BB348C608}" type="slidenum">
+              <a:rPr lang="en-US" smtClean="0"/>
+              <a:t>5</a:t>
+            </a:fld>
+            <a:endParaRPr lang="en-US"/>
+          </a:p>
+        </p:txBody>
+      </p:sp>
     </p:spTree>
     <p:extLst>
       <p:ext uri="{BB962C8B-B14F-4D97-AF65-F5344CB8AC3E}">
@@ -9662,6 +10160,35 @@
           </a:p>
         </p:txBody>
       </p:sp>
+      <p:sp>
+        <p:nvSpPr>
+          <p:cNvPr id="4" name="Slide Number Placeholder 3">
+            <a:extLst>
+              <a:ext uri="{FF2B5EF4-FFF2-40B4-BE49-F238E27FC236}">
+                <a16:creationId xmlns:a16="http://schemas.microsoft.com/office/drawing/2014/main" id="{857FA369-9AF8-48D6-878A-22C01DBDEF3F}"/>
+              </a:ext>
+            </a:extLst>
+          </p:cNvPr>
+          <p:cNvSpPr>
+            <a:spLocks noGrp="1"/>
+          </p:cNvSpPr>
+          <p:nvPr>
+            <p:ph type="sldNum" sz="quarter" idx="12"/>
+          </p:nvPr>
+        </p:nvSpPr>
+        <p:spPr/>
+        <p:txBody>
+          <a:bodyPr/>
+          <a:lstStyle/>
+          <a:p>
+            <a:fld id="{36417F31-DB7E-41E3-9A04-DC9BB348C608}" type="slidenum">
+              <a:rPr lang="en-US" smtClean="0"/>
+              <a:t>6</a:t>
+            </a:fld>
+            <a:endParaRPr lang="en-US"/>
+          </a:p>
+        </p:txBody>
+      </p:sp>
     </p:spTree>
     <p:extLst>
       <p:ext uri="{BB962C8B-B14F-4D97-AF65-F5344CB8AC3E}">
@@ -9813,6 +10340,35 @@
               <a:buNone/>
             </a:pPr>
             <a:endParaRPr lang="en-US" dirty="0"/>
+          </a:p>
+        </p:txBody>
+      </p:sp>
+      <p:sp>
+        <p:nvSpPr>
+          <p:cNvPr id="4" name="Slide Number Placeholder 3">
+            <a:extLst>
+              <a:ext uri="{FF2B5EF4-FFF2-40B4-BE49-F238E27FC236}">
+                <a16:creationId xmlns:a16="http://schemas.microsoft.com/office/drawing/2014/main" id="{36DE4806-250F-4E4A-826B-F4D2260E75D8}"/>
+              </a:ext>
+            </a:extLst>
+          </p:cNvPr>
+          <p:cNvSpPr>
+            <a:spLocks noGrp="1"/>
+          </p:cNvSpPr>
+          <p:nvPr>
+            <p:ph type="sldNum" sz="quarter" idx="12"/>
+          </p:nvPr>
+        </p:nvSpPr>
+        <p:spPr/>
+        <p:txBody>
+          <a:bodyPr/>
+          <a:lstStyle/>
+          <a:p>
+            <a:fld id="{36417F31-DB7E-41E3-9A04-DC9BB348C608}" type="slidenum">
+              <a:rPr lang="en-US" smtClean="0"/>
+              <a:t>7</a:t>
+            </a:fld>
+            <a:endParaRPr lang="en-US"/>
           </a:p>
         </p:txBody>
       </p:sp>
@@ -10722,4 +11278,299 @@
     </a:ext>
   </a:extLst>
 </a:theme>
+</file>
+
+<file path=ppt/theme/theme3.xml><?xml version="1.0" encoding="utf-8"?>
+<a:theme xmlns:a="http://schemas.openxmlformats.org/drawingml/2006/main" name="Office Theme">
+  <a:themeElements>
+    <a:clrScheme name="Office">
+      <a:dk1>
+        <a:sysClr val="windowText" lastClr="000000"/>
+      </a:dk1>
+      <a:lt1>
+        <a:sysClr val="window" lastClr="FFFFFF"/>
+      </a:lt1>
+      <a:dk2>
+        <a:srgbClr val="44546A"/>
+      </a:dk2>
+      <a:lt2>
+        <a:srgbClr val="E7E6E6"/>
+      </a:lt2>
+      <a:accent1>
+        <a:srgbClr val="4472C4"/>
+      </a:accent1>
+      <a:accent2>
+        <a:srgbClr val="ED7D31"/>
+      </a:accent2>
+      <a:accent3>
+        <a:srgbClr val="A5A5A5"/>
+      </a:accent3>
+      <a:accent4>
+        <a:srgbClr val="FFC000"/>
+      </a:accent4>
+      <a:accent5>
+        <a:srgbClr val="5B9BD5"/>
+      </a:accent5>
+      <a:accent6>
+        <a:srgbClr val="70AD47"/>
+      </a:accent6>
+      <a:hlink>
+        <a:srgbClr val="0563C1"/>
+      </a:hlink>
+      <a:folHlink>
+        <a:srgbClr val="954F72"/>
+      </a:folHlink>
+    </a:clrScheme>
+    <a:fontScheme name="Office">
+      <a:majorFont>
+        <a:latin typeface="Calibri Light" panose="020F0302020204030204"/>
+        <a:ea typeface=""/>
+        <a:cs typeface=""/>
+        <a:font script="Jpan" typeface="游ゴシック Light"/>
+        <a:font script="Hang" typeface="맑은 고딕"/>
+        <a:font script="Hans" typeface="等线 Light"/>
+        <a:font script="Hant" typeface="新細明體"/>
+        <a:font script="Arab" typeface="Times New Roman"/>
+        <a:font script="Hebr" typeface="Times New Roman"/>
+        <a:font script="Thai" typeface="Angsana New"/>
+        <a:font script="Ethi" typeface="Nyala"/>
+        <a:font script="Beng" typeface="Vrinda"/>
+        <a:font script="Gujr" typeface="Shruti"/>
+        <a:font script="Khmr" typeface="MoolBoran"/>
+        <a:font script="Knda" typeface="Tunga"/>
+        <a:font script="Guru" typeface="Raavi"/>
+        <a:font script="Cans" typeface="Euphemia"/>
+        <a:font script="Cher" typeface="Plantagenet Cherokee"/>
+        <a:font script="Yiii" typeface="Microsoft Yi Baiti"/>
+        <a:font script="Tibt" typeface="Microsoft Himalaya"/>
+        <a:font script="Thaa" typeface="MV Boli"/>
+        <a:font script="Deva" typeface="Mangal"/>
+        <a:font script="Telu" typeface="Gautami"/>
+        <a:font script="Taml" typeface="Latha"/>
+        <a:font script="Syrc" typeface="Estrangelo Edessa"/>
+        <a:font script="Orya" typeface="Kalinga"/>
+        <a:font script="Mlym" typeface="Kartika"/>
+        <a:font script="Laoo" typeface="DokChampa"/>
+        <a:font script="Sinh" typeface="Iskoola Pota"/>
+        <a:font script="Mong" typeface="Mongolian Baiti"/>
+        <a:font script="Viet" typeface="Times New Roman"/>
+        <a:font script="Uigh" typeface="Microsoft Uighur"/>
+        <a:font script="Geor" typeface="Sylfaen"/>
+        <a:font script="Armn" typeface="Arial"/>
+        <a:font script="Bugi" typeface="Leelawadee UI"/>
+        <a:font script="Bopo" typeface="Microsoft JhengHei"/>
+        <a:font script="Java" typeface="Javanese Text"/>
+        <a:font script="Lisu" typeface="Segoe UI"/>
+        <a:font script="Mymr" typeface="Myanmar Text"/>
+        <a:font script="Nkoo" typeface="Ebrima"/>
+        <a:font script="Olck" typeface="Nirmala UI"/>
+        <a:font script="Osma" typeface="Ebrima"/>
+        <a:font script="Phag" typeface="Phagspa"/>
+        <a:font script="Syrn" typeface="Estrangelo Edessa"/>
+        <a:font script="Syrj" typeface="Estrangelo Edessa"/>
+        <a:font script="Syre" typeface="Estrangelo Edessa"/>
+        <a:font script="Sora" typeface="Nirmala UI"/>
+        <a:font script="Tale" typeface="Microsoft Tai Le"/>
+        <a:font script="Talu" typeface="Microsoft New Tai Lue"/>
+        <a:font script="Tfng" typeface="Ebrima"/>
+      </a:majorFont>
+      <a:minorFont>
+        <a:latin typeface="Calibri" panose="020F0502020204030204"/>
+        <a:ea typeface=""/>
+        <a:cs typeface=""/>
+        <a:font script="Jpan" typeface="游ゴシック"/>
+        <a:font script="Hang" typeface="맑은 고딕"/>
+        <a:font script="Hans" typeface="等线"/>
+        <a:font script="Hant" typeface="新細明體"/>
+        <a:font script="Arab" typeface="Arial"/>
+        <a:font script="Hebr" typeface="Arial"/>
+        <a:font script="Thai" typeface="Cordia New"/>
+        <a:font script="Ethi" typeface="Nyala"/>
+        <a:font script="Beng" typeface="Vrinda"/>
+        <a:font script="Gujr" typeface="Shruti"/>
+        <a:font script="Khmr" typeface="DaunPenh"/>
+        <a:font script="Knda" typeface="Tunga"/>
+        <a:font script="Guru" typeface="Raavi"/>
+        <a:font script="Cans" typeface="Euphemia"/>
+        <a:font script="Cher" typeface="Plantagenet Cherokee"/>
+        <a:font script="Yiii" typeface="Microsoft Yi Baiti"/>
+        <a:font script="Tibt" typeface="Microsoft Himalaya"/>
+        <a:font script="Thaa" typeface="MV Boli"/>
+        <a:font script="Deva" typeface="Mangal"/>
+        <a:font script="Telu" typeface="Gautami"/>
+        <a:font script="Taml" typeface="Latha"/>
+        <a:font script="Syrc" typeface="Estrangelo Edessa"/>
+        <a:font script="Orya" typeface="Kalinga"/>
+        <a:font script="Mlym" typeface="Kartika"/>
+        <a:font script="Laoo" typeface="DokChampa"/>
+        <a:font script="Sinh" typeface="Iskoola Pota"/>
+        <a:font script="Mong" typeface="Mongolian Baiti"/>
+        <a:font script="Viet" typeface="Arial"/>
+        <a:font script="Uigh" typeface="Microsoft Uighur"/>
+        <a:font script="Geor" typeface="Sylfaen"/>
+        <a:font script="Armn" typeface="Arial"/>
+        <a:font script="Bugi" typeface="Leelawadee UI"/>
+        <a:font script="Bopo" typeface="Microsoft JhengHei"/>
+        <a:font script="Java" typeface="Javanese Text"/>
+        <a:font script="Lisu" typeface="Segoe UI"/>
+        <a:font script="Mymr" typeface="Myanmar Text"/>
+        <a:font script="Nkoo" typeface="Ebrima"/>
+        <a:font script="Olck" typeface="Nirmala UI"/>
+        <a:font script="Osma" typeface="Ebrima"/>
+        <a:font script="Phag" typeface="Phagspa"/>
+        <a:font script="Syrn" typeface="Estrangelo Edessa"/>
+        <a:font script="Syrj" typeface="Estrangelo Edessa"/>
+        <a:font script="Syre" typeface="Estrangelo Edessa"/>
+        <a:font script="Sora" typeface="Nirmala UI"/>
+        <a:font script="Tale" typeface="Microsoft Tai Le"/>
+        <a:font script="Talu" typeface="Microsoft New Tai Lue"/>
+        <a:font script="Tfng" typeface="Ebrima"/>
+      </a:minorFont>
+    </a:fontScheme>
+    <a:fmtScheme name="Office">
+      <a:fillStyleLst>
+        <a:solidFill>
+          <a:schemeClr val="phClr"/>
+        </a:solidFill>
+        <a:gradFill rotWithShape="1">
+          <a:gsLst>
+            <a:gs pos="0">
+              <a:schemeClr val="phClr">
+                <a:lumMod val="110000"/>
+                <a:satMod val="105000"/>
+                <a:tint val="67000"/>
+              </a:schemeClr>
+            </a:gs>
+            <a:gs pos="50000">
+              <a:schemeClr val="phClr">
+                <a:lumMod val="105000"/>
+                <a:satMod val="103000"/>
+                <a:tint val="73000"/>
+              </a:schemeClr>
+            </a:gs>
+            <a:gs pos="100000">
+              <a:schemeClr val="phClr">
+                <a:lumMod val="105000"/>
+                <a:satMod val="109000"/>
+                <a:tint val="81000"/>
+              </a:schemeClr>
+            </a:gs>
+          </a:gsLst>
+          <a:lin ang="5400000" scaled="0"/>
+        </a:gradFill>
+        <a:gradFill rotWithShape="1">
+          <a:gsLst>
+            <a:gs pos="0">
+              <a:schemeClr val="phClr">
+                <a:satMod val="103000"/>
+                <a:lumMod val="102000"/>
+                <a:tint val="94000"/>
+              </a:schemeClr>
+            </a:gs>
+            <a:gs pos="50000">
+              <a:schemeClr val="phClr">
+                <a:satMod val="110000"/>
+                <a:lumMod val="100000"/>
+                <a:shade val="100000"/>
+              </a:schemeClr>
+            </a:gs>
+            <a:gs pos="100000">
+              <a:schemeClr val="phClr">
+                <a:lumMod val="99000"/>
+                <a:satMod val="120000"/>
+                <a:shade val="78000"/>
+              </a:schemeClr>
+            </a:gs>
+          </a:gsLst>
+          <a:lin ang="5400000" scaled="0"/>
+        </a:gradFill>
+      </a:fillStyleLst>
+      <a:lnStyleLst>
+        <a:ln w="6350" cap="flat" cmpd="sng" algn="ctr">
+          <a:solidFill>
+            <a:schemeClr val="phClr"/>
+          </a:solidFill>
+          <a:prstDash val="solid"/>
+          <a:miter lim="800000"/>
+        </a:ln>
+        <a:ln w="12700" cap="flat" cmpd="sng" algn="ctr">
+          <a:solidFill>
+            <a:schemeClr val="phClr"/>
+          </a:solidFill>
+          <a:prstDash val="solid"/>
+          <a:miter lim="800000"/>
+        </a:ln>
+        <a:ln w="19050" cap="flat" cmpd="sng" algn="ctr">
+          <a:solidFill>
+            <a:schemeClr val="phClr"/>
+          </a:solidFill>
+          <a:prstDash val="solid"/>
+          <a:miter lim="800000"/>
+        </a:ln>
+      </a:lnStyleLst>
+      <a:effectStyleLst>
+        <a:effectStyle>
+          <a:effectLst/>
+        </a:effectStyle>
+        <a:effectStyle>
+          <a:effectLst/>
+        </a:effectStyle>
+        <a:effectStyle>
+          <a:effectLst>
+            <a:outerShdw blurRad="57150" dist="19050" dir="5400000" algn="ctr" rotWithShape="0">
+              <a:srgbClr val="000000">
+                <a:alpha val="63000"/>
+              </a:srgbClr>
+            </a:outerShdw>
+          </a:effectLst>
+        </a:effectStyle>
+      </a:effectStyleLst>
+      <a:bgFillStyleLst>
+        <a:solidFill>
+          <a:schemeClr val="phClr"/>
+        </a:solidFill>
+        <a:solidFill>
+          <a:schemeClr val="phClr">
+            <a:tint val="95000"/>
+            <a:satMod val="170000"/>
+          </a:schemeClr>
+        </a:solidFill>
+        <a:gradFill rotWithShape="1">
+          <a:gsLst>
+            <a:gs pos="0">
+              <a:schemeClr val="phClr">
+                <a:tint val="93000"/>
+                <a:satMod val="150000"/>
+                <a:shade val="98000"/>
+                <a:lumMod val="102000"/>
+              </a:schemeClr>
+            </a:gs>
+            <a:gs pos="50000">
+              <a:schemeClr val="phClr">
+                <a:tint val="98000"/>
+                <a:satMod val="130000"/>
+                <a:shade val="90000"/>
+                <a:lumMod val="103000"/>
+              </a:schemeClr>
+            </a:gs>
+            <a:gs pos="100000">
+              <a:schemeClr val="phClr">
+                <a:shade val="63000"/>
+                <a:satMod val="120000"/>
+              </a:schemeClr>
+            </a:gs>
+          </a:gsLst>
+          <a:lin ang="5400000" scaled="0"/>
+        </a:gradFill>
+      </a:bgFillStyleLst>
+    </a:fmtScheme>
+  </a:themeElements>
+  <a:objectDefaults/>
+  <a:extraClrSchemeLst/>
+  <a:extLst>
+    <a:ext uri="{05A4C25C-085E-4340-85A3-A5531E510DB2}">
+      <thm15:themeFamily xmlns:thm15="http://schemas.microsoft.com/office/thememl/2012/main" name="Office Theme" id="{62F939B6-93AF-4DB8-9C6B-D6C7DFDC589F}" vid="{4A3C46E8-61CC-4603-A589-7422A47A8E4A}"/>
+    </a:ext>
+  </a:extLst>
+</a:theme>
 </file>
</xml_diff>

<commit_message>
Fixes for day 1
</commit_message>
<xml_diff>
--- a/day1/lab1_bevholt.pptx
+++ b/day1/lab1_bevholt.pptx
@@ -208,7 +208,7 @@
           <a:p>
             <a:fld id="{F2388989-7179-4868-8471-A7A056B96C7C}" type="datetimeFigureOut">
               <a:rPr lang="en-US" smtClean="0"/>
-              <a:t>1/14/2018</a:t>
+              <a:t>1/15/2018</a:t>
             </a:fld>
             <a:endParaRPr lang="en-US"/>
           </a:p>
@@ -557,7 +557,7 @@
           </a:ln>
           <a:extLst>
             <a:ext uri="{909E8E84-426E-40dd-AFC4-6F175D3DCCD1}">
-              <a14:hiddenFill xmlns:a14="http://schemas.microsoft.com/office/drawing/2010/main" xmlns="">
+              <a14:hiddenFill xmlns="" xmlns:a14="http://schemas.microsoft.com/office/drawing/2010/main">
                 <a:solidFill>
                   <a:srgbClr val="FFFFFF"/>
                 </a:solidFill>
@@ -600,7 +600,7 @@
           </a:ln>
           <a:extLst>
             <a:ext uri="{909E8E84-426E-40dd-AFC4-6F175D3DCCD1}">
-              <a14:hiddenFill xmlns:a14="http://schemas.microsoft.com/office/drawing/2010/main" xmlns="">
+              <a14:hiddenFill xmlns="" xmlns:a14="http://schemas.microsoft.com/office/drawing/2010/main">
                 <a:noFill/>
               </a14:hiddenFill>
             </a:ext>
@@ -699,7 +699,7 @@
           <a:p>
             <a:fld id="{473094AD-038C-43A2-A4DE-BB0813E6E51E}" type="datetime1">
               <a:rPr lang="en-US" smtClean="0"/>
-              <a:t>1/14/2018</a:t>
+              <a:t>1/15/2018</a:t>
             </a:fld>
             <a:endParaRPr lang="en-US"/>
           </a:p>
@@ -886,7 +886,7 @@
           <a:p>
             <a:fld id="{1F0E199C-061B-4949-9C96-AC248C0D8DD3}" type="datetime1">
               <a:rPr lang="en-US" smtClean="0"/>
-              <a:t>1/14/2018</a:t>
+              <a:t>1/15/2018</a:t>
             </a:fld>
             <a:endParaRPr lang="en-US"/>
           </a:p>
@@ -1082,7 +1082,7 @@
           <a:p>
             <a:fld id="{EF845CA7-EB4A-4003-96F7-46C5013AEA42}" type="datetime1">
               <a:rPr lang="en-US" smtClean="0"/>
-              <a:t>1/14/2018</a:t>
+              <a:t>1/15/2018</a:t>
             </a:fld>
             <a:endParaRPr lang="en-US"/>
           </a:p>
@@ -1334,7 +1334,7 @@
           <a:p>
             <a:fld id="{2D858B87-F135-4381-8E7E-B64D4228932C}" type="datetime1">
               <a:rPr lang="en-US" smtClean="0"/>
-              <a:t>1/14/2018</a:t>
+              <a:t>1/15/2018</a:t>
             </a:fld>
             <a:endParaRPr lang="en-US"/>
           </a:p>
@@ -1558,7 +1558,7 @@
           <a:p>
             <a:fld id="{3B3C5764-E191-4322-8BA3-3D7CBE2CF8D1}" type="datetime1">
               <a:rPr lang="en-US" smtClean="0"/>
-              <a:t>1/14/2018</a:t>
+              <a:t>1/15/2018</a:t>
             </a:fld>
             <a:endParaRPr lang="en-US"/>
           </a:p>
@@ -1866,7 +1866,7 @@
           <a:p>
             <a:fld id="{CCFF9CC7-9DD7-495E-8E0C-D2152E7ED385}" type="datetime1">
               <a:rPr lang="en-US" smtClean="0"/>
-              <a:t>1/14/2018</a:t>
+              <a:t>1/15/2018</a:t>
             </a:fld>
             <a:endParaRPr lang="en-US"/>
           </a:p>
@@ -2034,7 +2034,7 @@
           <a:p>
             <a:fld id="{7AF3F41F-A6FA-40C5-99E0-3F86C98F6608}" type="datetime1">
               <a:rPr lang="en-US" smtClean="0"/>
-              <a:t>1/14/2018</a:t>
+              <a:t>1/15/2018</a:t>
             </a:fld>
             <a:endParaRPr lang="en-US"/>
           </a:p>
@@ -2346,7 +2346,7 @@
           <a:p>
             <a:fld id="{9620DF9F-793E-4985-B9D8-992C6E2DA332}" type="datetime1">
               <a:rPr lang="en-US" smtClean="0"/>
-              <a:t>1/14/2018</a:t>
+              <a:t>1/15/2018</a:t>
             </a:fld>
             <a:endParaRPr lang="en-US"/>
           </a:p>
@@ -2658,7 +2658,7 @@
           <a:p>
             <a:fld id="{796EA9D4-2AD1-4101-A286-77D37AAADFED}" type="datetime1">
               <a:rPr lang="en-US" smtClean="0"/>
-              <a:t>1/14/2018</a:t>
+              <a:t>1/15/2018</a:t>
             </a:fld>
             <a:endParaRPr lang="en-US"/>
           </a:p>
@@ -2878,7 +2878,7 @@
           <a:p>
             <a:fld id="{2BD0993A-8691-4A87-9C49-3CE884C47D45}" type="datetime1">
               <a:rPr lang="en-US" smtClean="0"/>
-              <a:t>1/14/2018</a:t>
+              <a:t>1/15/2018</a:t>
             </a:fld>
             <a:endParaRPr lang="en-US"/>
           </a:p>
@@ -3076,7 +3076,7 @@
           <a:p>
             <a:fld id="{BF316B00-A11D-4D80-BD0B-755A2969FF78}" type="datetime1">
               <a:rPr lang="en-US" smtClean="0"/>
-              <a:t>1/14/2018</a:t>
+              <a:t>1/15/2018</a:t>
             </a:fld>
             <a:endParaRPr lang="en-US"/>
           </a:p>
@@ -3262,7 +3262,7 @@
           <a:p>
             <a:fld id="{FB49576D-E9F4-42BB-BC13-B23B3C4B0843}" type="datetime1">
               <a:rPr lang="en-US" smtClean="0"/>
-              <a:t>1/14/2018</a:t>
+              <a:t>1/15/2018</a:t>
             </a:fld>
             <a:endParaRPr lang="en-US"/>
           </a:p>
@@ -3537,7 +3537,7 @@
           <a:p>
             <a:fld id="{C79C30F5-8523-4EB9-ACC0-9A01E3FEDA29}" type="datetime1">
               <a:rPr lang="en-US" smtClean="0"/>
-              <a:t>1/14/2018</a:t>
+              <a:t>1/15/2018</a:t>
             </a:fld>
             <a:endParaRPr lang="en-US"/>
           </a:p>
@@ -3802,7 +3802,7 @@
           <a:p>
             <a:fld id="{31EA960D-B428-435A-A5E7-264A6D063906}" type="datetime1">
               <a:rPr lang="en-US" smtClean="0"/>
-              <a:t>1/14/2018</a:t>
+              <a:t>1/15/2018</a:t>
             </a:fld>
             <a:endParaRPr lang="en-US"/>
           </a:p>
@@ -4214,7 +4214,7 @@
           <a:p>
             <a:fld id="{3C27B052-FF7D-466F-9234-659183862C88}" type="datetime1">
               <a:rPr lang="en-US" smtClean="0"/>
-              <a:t>1/14/2018</a:t>
+              <a:t>1/15/2018</a:t>
             </a:fld>
             <a:endParaRPr lang="en-US"/>
           </a:p>
@@ -4355,7 +4355,7 @@
           <a:p>
             <a:fld id="{30E86C0C-8755-49A7-BEFB-7AA12254EBB9}" type="datetime1">
               <a:rPr lang="en-US" smtClean="0"/>
-              <a:t>1/14/2018</a:t>
+              <a:t>1/15/2018</a:t>
             </a:fld>
             <a:endParaRPr lang="en-US"/>
           </a:p>
@@ -4468,7 +4468,7 @@
           <a:p>
             <a:fld id="{E8B48827-F8F9-4844-A257-9CA23F7E0DA1}" type="datetime1">
               <a:rPr lang="en-US" smtClean="0"/>
-              <a:t>1/14/2018</a:t>
+              <a:t>1/15/2018</a:t>
             </a:fld>
             <a:endParaRPr lang="en-US"/>
           </a:p>
@@ -4779,7 +4779,7 @@
           <a:p>
             <a:fld id="{EE8BAE2C-037A-4C2F-87D7-09EE32575BC5}" type="datetime1">
               <a:rPr lang="en-US" smtClean="0"/>
-              <a:t>1/14/2018</a:t>
+              <a:t>1/15/2018</a:t>
             </a:fld>
             <a:endParaRPr lang="en-US"/>
           </a:p>
@@ -5070,7 +5070,7 @@
           <a:p>
             <a:fld id="{33BA7458-4B9B-4BD7-9049-0CDF114B9A90}" type="datetime1">
               <a:rPr lang="en-US" smtClean="0"/>
-              <a:t>1/14/2018</a:t>
+              <a:t>1/15/2018</a:t>
             </a:fld>
             <a:endParaRPr lang="en-US"/>
           </a:p>
@@ -5268,7 +5268,7 @@
           <a:p>
             <a:fld id="{5F138F74-D09C-4A4F-9011-F5861002FF66}" type="datetime1">
               <a:rPr lang="en-US" smtClean="0"/>
-              <a:t>1/14/2018</a:t>
+              <a:t>1/15/2018</a:t>
             </a:fld>
             <a:endParaRPr lang="en-US"/>
           </a:p>
@@ -5476,7 +5476,7 @@
           <a:p>
             <a:fld id="{B023AC82-5023-4B40-8E7B-CB32645BA3C1}" type="datetime1">
               <a:rPr lang="en-US" smtClean="0"/>
-              <a:t>1/14/2018</a:t>
+              <a:t>1/15/2018</a:t>
             </a:fld>
             <a:endParaRPr lang="en-US"/>
           </a:p>
@@ -5685,7 +5685,7 @@
           <a:p>
             <a:fld id="{CB9270DE-3C8A-43D2-B05F-DCE66535FA1A}" type="datetime1">
               <a:rPr lang="en-US" smtClean="0"/>
-              <a:t>1/14/2018</a:t>
+              <a:t>1/15/2018</a:t>
             </a:fld>
             <a:endParaRPr lang="en-US"/>
           </a:p>
@@ -5988,7 +5988,7 @@
           <a:p>
             <a:fld id="{5F9A8E4F-B453-4822-A448-33EE436F9AB4}" type="datetime1">
               <a:rPr lang="en-US" smtClean="0"/>
-              <a:t>1/14/2018</a:t>
+              <a:t>1/15/2018</a:t>
             </a:fld>
             <a:endParaRPr lang="en-US"/>
           </a:p>
@@ -6430,7 +6430,7 @@
           <a:p>
             <a:fld id="{F917497C-C63C-412A-9DFD-A2E04718E293}" type="datetime1">
               <a:rPr lang="en-US" smtClean="0"/>
-              <a:t>1/14/2018</a:t>
+              <a:t>1/15/2018</a:t>
             </a:fld>
             <a:endParaRPr lang="en-US"/>
           </a:p>
@@ -6565,7 +6565,7 @@
           <a:p>
             <a:fld id="{F6E66BCC-7079-4559-85D5-50A66D933026}" type="datetime1">
               <a:rPr lang="en-US" smtClean="0"/>
-              <a:t>1/14/2018</a:t>
+              <a:t>1/15/2018</a:t>
             </a:fld>
             <a:endParaRPr lang="en-US"/>
           </a:p>
@@ -6678,7 +6678,7 @@
           <a:p>
             <a:fld id="{6B4C6DDB-E43F-4445-B916-EA8EF73BA2E9}" type="datetime1">
               <a:rPr lang="en-US" smtClean="0"/>
-              <a:t>1/14/2018</a:t>
+              <a:t>1/15/2018</a:t>
             </a:fld>
             <a:endParaRPr lang="en-US"/>
           </a:p>
@@ -6971,7 +6971,7 @@
           <a:p>
             <a:fld id="{28A0BF00-D669-4C78-910C-5733C04ABD2D}" type="datetime1">
               <a:rPr lang="en-US" smtClean="0"/>
-              <a:t>1/14/2018</a:t>
+              <a:t>1/15/2018</a:t>
             </a:fld>
             <a:endParaRPr lang="en-US"/>
           </a:p>
@@ -7245,7 +7245,7 @@
           <a:p>
             <a:fld id="{1D17FF70-BB30-46BB-AA76-2B519CE88675}" type="datetime1">
               <a:rPr lang="en-US" smtClean="0"/>
-              <a:t>1/14/2018</a:t>
+              <a:t>1/15/2018</a:t>
             </a:fld>
             <a:endParaRPr lang="en-US"/>
           </a:p>
@@ -7367,17 +7367,17 @@
           </a:ln>
           <a:extLst>
             <a:ext uri="{FAA26D3D-D897-4be2-8F04-BA451C77F1D7}">
-              <ma14:placeholderFlag xmlns:ma14="http://schemas.microsoft.com/office/mac/drawingml/2011/main" xmlns="" val="1"/>
+              <ma14:placeholderFlag xmlns="" xmlns:ma14="http://schemas.microsoft.com/office/mac/drawingml/2011/main" val="1"/>
             </a:ext>
             <a:ext uri="{909E8E84-426E-40dd-AFC4-6F175D3DCCD1}">
-              <a14:hiddenFill xmlns:a14="http://schemas.microsoft.com/office/drawing/2010/main" xmlns="">
+              <a14:hiddenFill xmlns="" xmlns:a14="http://schemas.microsoft.com/office/drawing/2010/main">
                 <a:solidFill>
                   <a:srgbClr val="FFFFFF"/>
                 </a:solidFill>
               </a14:hiddenFill>
             </a:ext>
             <a:ext uri="{91240B29-F687-4f45-9708-019B960494DF}">
-              <a14:hiddenLine xmlns:a14="http://schemas.microsoft.com/office/drawing/2010/main" xmlns="" w="9525">
+              <a14:hiddenLine xmlns="" xmlns:a14="http://schemas.microsoft.com/office/drawing/2010/main" w="9525">
                 <a:solidFill>
                   <a:srgbClr val="000000"/>
                 </a:solidFill>
@@ -7429,17 +7429,17 @@
           </a:ln>
           <a:extLst>
             <a:ext uri="{FAA26D3D-D897-4be2-8F04-BA451C77F1D7}">
-              <ma14:placeholderFlag xmlns:ma14="http://schemas.microsoft.com/office/mac/drawingml/2011/main" xmlns="" val="1"/>
+              <ma14:placeholderFlag xmlns="" xmlns:ma14="http://schemas.microsoft.com/office/mac/drawingml/2011/main" val="1"/>
             </a:ext>
             <a:ext uri="{909E8E84-426E-40dd-AFC4-6F175D3DCCD1}">
-              <a14:hiddenFill xmlns:a14="http://schemas.microsoft.com/office/drawing/2010/main" xmlns="">
+              <a14:hiddenFill xmlns="" xmlns:a14="http://schemas.microsoft.com/office/drawing/2010/main">
                 <a:solidFill>
                   <a:srgbClr val="FFFFFF"/>
                 </a:solidFill>
               </a14:hiddenFill>
             </a:ext>
             <a:ext uri="{91240B29-F687-4f45-9708-019B960494DF}">
-              <a14:hiddenLine xmlns:a14="http://schemas.microsoft.com/office/drawing/2010/main" xmlns="" w="9525">
+              <a14:hiddenLine xmlns="" xmlns:a14="http://schemas.microsoft.com/office/drawing/2010/main" w="9525">
                 <a:solidFill>
                   <a:srgbClr val="000000"/>
                 </a:solidFill>
@@ -7539,7 +7539,7 @@
           <a:p>
             <a:fld id="{793CCD87-1551-4F91-BE02-F4A09E617739}" type="datetime1">
               <a:rPr lang="en-US" smtClean="0"/>
-              <a:t>1/14/2018</a:t>
+              <a:t>1/15/2018</a:t>
             </a:fld>
             <a:endParaRPr lang="en-US"/>
           </a:p>
@@ -7707,7 +7707,7 @@
           </a:ln>
           <a:extLst>
             <a:ext uri="{909E8E84-426E-40dd-AFC4-6F175D3DCCD1}">
-              <a14:hiddenFill xmlns:a14="http://schemas.microsoft.com/office/drawing/2010/main" xmlns="">
+              <a14:hiddenFill xmlns="" xmlns:a14="http://schemas.microsoft.com/office/drawing/2010/main">
                 <a:solidFill>
                   <a:srgbClr val="FFFFFF"/>
                 </a:solidFill>
@@ -7750,7 +7750,7 @@
           </a:ln>
           <a:extLst>
             <a:ext uri="{909E8E84-426E-40dd-AFC4-6F175D3DCCD1}">
-              <a14:hiddenFill xmlns:a14="http://schemas.microsoft.com/office/drawing/2010/main" xmlns="">
+              <a14:hiddenFill xmlns="" xmlns:a14="http://schemas.microsoft.com/office/drawing/2010/main">
                 <a:noFill/>
               </a14:hiddenFill>
             </a:ext>
@@ -8386,7 +8386,7 @@
           <a:p>
             <a:fld id="{FBD26717-3E2A-491D-9A2B-0D747605CA1D}" type="datetime1">
               <a:rPr lang="en-US" smtClean="0"/>
-              <a:t>1/14/2018</a:t>
+              <a:t>1/15/2018</a:t>
             </a:fld>
             <a:endParaRPr lang="en-US"/>
           </a:p>
@@ -9037,7 +9037,7 @@
           <a:graphicData uri="http://schemas.openxmlformats.org/presentationml/2006/ole">
             <mc:AlternateContent xmlns:mc="http://schemas.openxmlformats.org/markup-compatibility/2006">
               <mc:Choice xmlns:v="urn:schemas-microsoft-com:vml" Requires="v">
-                <p:oleObj spid="_x0000_s1036" name="Equation" r:id="rId3" imgW="2692080" imgH="634680" progId="Equation.DSMT4">
+                <p:oleObj spid="_x0000_s1038" name="Equation" r:id="rId3" imgW="2692080" imgH="634680" progId="Equation.DSMT4">
                   <p:embed/>
                 </p:oleObj>
               </mc:Choice>
@@ -9302,18 +9302,11 @@
               <a:buNone/>
             </a:pPr>
             <a:r>
-              <a:rPr lang="en-US" sz="2000">
-                <a:latin typeface="Courier New" panose="02070309020205020404" pitchFamily="49" charset="0"/>
-                <a:cs typeface="Courier New" panose="02070309020205020404" pitchFamily="49" charset="0"/>
-              </a:rPr>
-              <a:t>compile</a:t>
-            </a:r>
-            <a:r>
               <a:rPr lang="en-US" sz="2000" dirty="0">
                 <a:latin typeface="Courier New" panose="02070309020205020404" pitchFamily="49" charset="0"/>
                 <a:cs typeface="Courier New" panose="02070309020205020404" pitchFamily="49" charset="0"/>
               </a:rPr>
-              <a:t>("</a:t>
+              <a:t>compile("</a:t>
             </a:r>
             <a:r>
               <a:rPr lang="en-US" sz="2000" dirty="0" err="1">
@@ -9823,7 +9816,7 @@
             </a:pPr>
             <a:r>
               <a:rPr lang="en-US" dirty="0"/>
-              <a:t>Use 100 steps for each (100.000 total </a:t>
+              <a:t>Use 100 steps for each (10000 total </a:t>
             </a:r>
             <a:r>
               <a:rPr lang="en-US" dirty="0" err="1"/>

</xml_diff>